<commit_message>
changed to new docker scripts
</commit_message>
<xml_diff>
--- a/slides/images/graphics.pptx
+++ b/slides/images/graphics.pptx
@@ -6,6 +6,7 @@
   </p:sldMasterIdLst>
   <p:sldIdLst>
     <p:sldId id="256" r:id="rId2"/>
+    <p:sldId id="257" r:id="rId3"/>
   </p:sldIdLst>
   <p:sldSz cx="12192000" cy="6858000"/>
   <p:notesSz cx="6858000" cy="9144000"/>
@@ -104,6 +105,11 @@
       </a:defRPr>
     </a:lvl9pPr>
   </p:defaultTextStyle>
+  <p:extLst>
+    <p:ext uri="{EFAFB233-063F-42B5-8137-9DF3F51BA10A}">
+      <p15:sldGuideLst xmlns:p15="http://schemas.microsoft.com/office/powerpoint/2012/main"/>
+    </p:ext>
+  </p:extLst>
 </p:presentation>
 </file>
 
@@ -256,7 +262,7 @@
           <a:p>
             <a:fld id="{95FFB93D-DBB6-4626-8770-6183B8221187}" type="datetimeFigureOut">
               <a:rPr lang="de-CH" smtClean="0"/>
-              <a:t>16.11.2018</a:t>
+              <a:t>23.11.2018</a:t>
             </a:fld>
             <a:endParaRPr lang="de-CH"/>
           </a:p>
@@ -456,7 +462,7 @@
           <a:p>
             <a:fld id="{95FFB93D-DBB6-4626-8770-6183B8221187}" type="datetimeFigureOut">
               <a:rPr lang="de-CH" smtClean="0"/>
-              <a:t>16.11.2018</a:t>
+              <a:t>23.11.2018</a:t>
             </a:fld>
             <a:endParaRPr lang="de-CH"/>
           </a:p>
@@ -666,7 +672,7 @@
           <a:p>
             <a:fld id="{95FFB93D-DBB6-4626-8770-6183B8221187}" type="datetimeFigureOut">
               <a:rPr lang="de-CH" smtClean="0"/>
-              <a:t>16.11.2018</a:t>
+              <a:t>23.11.2018</a:t>
             </a:fld>
             <a:endParaRPr lang="de-CH"/>
           </a:p>
@@ -866,7 +872,7 @@
           <a:p>
             <a:fld id="{95FFB93D-DBB6-4626-8770-6183B8221187}" type="datetimeFigureOut">
               <a:rPr lang="de-CH" smtClean="0"/>
-              <a:t>16.11.2018</a:t>
+              <a:t>23.11.2018</a:t>
             </a:fld>
             <a:endParaRPr lang="de-CH"/>
           </a:p>
@@ -1142,7 +1148,7 @@
           <a:p>
             <a:fld id="{95FFB93D-DBB6-4626-8770-6183B8221187}" type="datetimeFigureOut">
               <a:rPr lang="de-CH" smtClean="0"/>
-              <a:t>16.11.2018</a:t>
+              <a:t>23.11.2018</a:t>
             </a:fld>
             <a:endParaRPr lang="de-CH"/>
           </a:p>
@@ -1410,7 +1416,7 @@
           <a:p>
             <a:fld id="{95FFB93D-DBB6-4626-8770-6183B8221187}" type="datetimeFigureOut">
               <a:rPr lang="de-CH" smtClean="0"/>
-              <a:t>16.11.2018</a:t>
+              <a:t>23.11.2018</a:t>
             </a:fld>
             <a:endParaRPr lang="de-CH"/>
           </a:p>
@@ -1825,7 +1831,7 @@
           <a:p>
             <a:fld id="{95FFB93D-DBB6-4626-8770-6183B8221187}" type="datetimeFigureOut">
               <a:rPr lang="de-CH" smtClean="0"/>
-              <a:t>16.11.2018</a:t>
+              <a:t>23.11.2018</a:t>
             </a:fld>
             <a:endParaRPr lang="de-CH"/>
           </a:p>
@@ -1967,7 +1973,7 @@
           <a:p>
             <a:fld id="{95FFB93D-DBB6-4626-8770-6183B8221187}" type="datetimeFigureOut">
               <a:rPr lang="de-CH" smtClean="0"/>
-              <a:t>16.11.2018</a:t>
+              <a:t>23.11.2018</a:t>
             </a:fld>
             <a:endParaRPr lang="de-CH"/>
           </a:p>
@@ -2080,7 +2086,7 @@
           <a:p>
             <a:fld id="{95FFB93D-DBB6-4626-8770-6183B8221187}" type="datetimeFigureOut">
               <a:rPr lang="de-CH" smtClean="0"/>
-              <a:t>16.11.2018</a:t>
+              <a:t>23.11.2018</a:t>
             </a:fld>
             <a:endParaRPr lang="de-CH"/>
           </a:p>
@@ -2393,7 +2399,7 @@
           <a:p>
             <a:fld id="{95FFB93D-DBB6-4626-8770-6183B8221187}" type="datetimeFigureOut">
               <a:rPr lang="de-CH" smtClean="0"/>
-              <a:t>16.11.2018</a:t>
+              <a:t>23.11.2018</a:t>
             </a:fld>
             <a:endParaRPr lang="de-CH"/>
           </a:p>
@@ -2682,7 +2688,7 @@
           <a:p>
             <a:fld id="{95FFB93D-DBB6-4626-8770-6183B8221187}" type="datetimeFigureOut">
               <a:rPr lang="de-CH" smtClean="0"/>
-              <a:t>16.11.2018</a:t>
+              <a:t>23.11.2018</a:t>
             </a:fld>
             <a:endParaRPr lang="de-CH"/>
           </a:p>
@@ -2925,7 +2931,7 @@
           <a:p>
             <a:fld id="{95FFB93D-DBB6-4626-8770-6183B8221187}" type="datetimeFigureOut">
               <a:rPr lang="de-CH" smtClean="0"/>
-              <a:t>16.11.2018</a:t>
+              <a:t>23.11.2018</a:t>
             </a:fld>
             <a:endParaRPr lang="de-CH"/>
           </a:p>
@@ -3342,60 +3348,1055 @@
           <a:chExt cx="0" cy="0"/>
         </a:xfrm>
       </p:grpSpPr>
-      <p:sp>
-        <p:nvSpPr>
-          <p:cNvPr id="2" name="Title 1">
-            <a:extLst>
-              <a:ext uri="{FF2B5EF4-FFF2-40B4-BE49-F238E27FC236}">
-                <a16:creationId xmlns:a16="http://schemas.microsoft.com/office/drawing/2014/main" id="{34650AC3-474E-471B-AFB6-5EDC7F02C493}"/>
-              </a:ext>
-            </a:extLst>
-          </p:cNvPr>
-          <p:cNvSpPr>
-            <a:spLocks noGrp="1"/>
-          </p:cNvSpPr>
-          <p:nvPr>
-            <p:ph type="ctrTitle"/>
-          </p:nvPr>
-        </p:nvSpPr>
-        <p:spPr/>
-        <p:txBody>
-          <a:bodyPr/>
-          <a:lstStyle/>
-          <a:p>
-            <a:endParaRPr lang="de-CH"/>
-          </a:p>
-        </p:txBody>
-      </p:sp>
-      <p:sp>
-        <p:nvSpPr>
-          <p:cNvPr id="3" name="Subtitle 2">
-            <a:extLst>
-              <a:ext uri="{FF2B5EF4-FFF2-40B4-BE49-F238E27FC236}">
-                <a16:creationId xmlns:a16="http://schemas.microsoft.com/office/drawing/2014/main" id="{D01F9C2C-6A07-4444-92CE-7C7D0A199791}"/>
-              </a:ext>
-            </a:extLst>
-          </p:cNvPr>
-          <p:cNvSpPr>
-            <a:spLocks noGrp="1"/>
-          </p:cNvSpPr>
-          <p:nvPr>
-            <p:ph type="subTitle" idx="1"/>
-          </p:nvPr>
-        </p:nvSpPr>
-        <p:spPr/>
-        <p:txBody>
-          <a:bodyPr/>
-          <a:lstStyle/>
-          <a:p>
-            <a:endParaRPr lang="de-CH"/>
-          </a:p>
-        </p:txBody>
-      </p:sp>
+      <p:grpSp>
+        <p:nvGrpSpPr>
+          <p:cNvPr id="7" name="Group 6">
+            <a:extLst>
+              <a:ext uri="{FF2B5EF4-FFF2-40B4-BE49-F238E27FC236}">
+                <a16:creationId xmlns:a16="http://schemas.microsoft.com/office/drawing/2014/main" id="{858E3713-6633-4DE8-A1FC-0290ACEE9349}"/>
+              </a:ext>
+            </a:extLst>
+          </p:cNvPr>
+          <p:cNvGrpSpPr/>
+          <p:nvPr/>
+        </p:nvGrpSpPr>
+        <p:grpSpPr>
+          <a:xfrm>
+            <a:off x="762000" y="968829"/>
+            <a:ext cx="6640286" cy="3063197"/>
+            <a:chOff x="762000" y="968829"/>
+            <a:chExt cx="6640286" cy="3063197"/>
+          </a:xfrm>
+        </p:grpSpPr>
+        <p:sp>
+          <p:nvSpPr>
+            <p:cNvPr id="4" name="TextBox 3">
+              <a:extLst>
+                <a:ext uri="{FF2B5EF4-FFF2-40B4-BE49-F238E27FC236}">
+                  <a16:creationId xmlns:a16="http://schemas.microsoft.com/office/drawing/2014/main" id="{C65B17C5-D5F7-4E92-ABEF-E258D91984B9}"/>
+                </a:ext>
+              </a:extLst>
+            </p:cNvPr>
+            <p:cNvSpPr txBox="1"/>
+            <p:nvPr/>
+          </p:nvSpPr>
+          <p:spPr>
+            <a:xfrm>
+              <a:off x="2264229" y="1785257"/>
+              <a:ext cx="5138057" cy="2246769"/>
+            </a:xfrm>
+            <a:prstGeom prst="rect">
+              <a:avLst/>
+            </a:prstGeom>
+            <a:noFill/>
+          </p:spPr>
+          <p:txBody>
+            <a:bodyPr wrap="square" rtlCol="0">
+              <a:spAutoFit/>
+            </a:bodyPr>
+            <a:lstStyle/>
+            <a:p>
+              <a:r>
+                <a:rPr lang="en-CH" sz="2800" dirty="0"/>
+                <a:t>c</a:t>
+              </a:r>
+              <a:r>
+                <a:rPr lang="de-CH" sz="2800" dirty="0"/>
+                <a:t>l</a:t>
+              </a:r>
+              <a:r>
+                <a:rPr lang="en-CH" sz="2800" dirty="0"/>
+                <a:t>a</a:t>
+              </a:r>
+              <a:r>
+                <a:rPr lang="de-CH" sz="2800" dirty="0"/>
+                <a:t>s</a:t>
+              </a:r>
+              <a:r>
+                <a:rPr lang="en-CH" sz="2800" dirty="0"/>
+                <a:t>s </a:t>
+              </a:r>
+              <a:r>
+                <a:rPr lang="de-CH" sz="2800" b="1" dirty="0"/>
+                <a:t>S</a:t>
+              </a:r>
+              <a:r>
+                <a:rPr lang="en-CH" sz="2800" b="1" dirty="0"/>
+                <a:t>t</a:t>
+              </a:r>
+              <a:r>
+                <a:rPr lang="de-CH" sz="2800" b="1" dirty="0"/>
+                <a:t>a</a:t>
+              </a:r>
+              <a:r>
+                <a:rPr lang="en-CH" sz="2800" b="1" dirty="0"/>
+                <a:t>c</a:t>
+              </a:r>
+              <a:r>
+                <a:rPr lang="de-CH" sz="2800" b="1" dirty="0"/>
+                <a:t>k</a:t>
+              </a:r>
+              <a:r>
+                <a:rPr lang="en-CH" sz="2800" dirty="0">
+                  <a:solidFill>
+                    <a:srgbClr val="FF0000"/>
+                  </a:solidFill>
+                </a:rPr>
+                <a:t>&lt;</a:t>
+              </a:r>
+              <a:r>
+                <a:rPr lang="de-CH" sz="2800" dirty="0">
+                  <a:solidFill>
+                    <a:srgbClr val="FF0000"/>
+                  </a:solidFill>
+                </a:rPr>
+                <a:t>T</a:t>
+              </a:r>
+              <a:r>
+                <a:rPr lang="en-CH" sz="2800" dirty="0">
+                  <a:solidFill>
+                    <a:srgbClr val="FF0000"/>
+                  </a:solidFill>
+                </a:rPr>
+                <a:t>&gt;</a:t>
+              </a:r>
+              <a:r>
+                <a:rPr lang="en-CH" sz="2800" dirty="0"/>
+                <a:t> {</a:t>
+              </a:r>
+            </a:p>
+            <a:p>
+              <a:r>
+                <a:rPr lang="en-CH" sz="2800" dirty="0"/>
+                <a:t>    </a:t>
+              </a:r>
+              <a:r>
+                <a:rPr lang="de-CH" sz="2800" dirty="0">
+                  <a:solidFill>
+                    <a:srgbClr val="FF0000"/>
+                  </a:solidFill>
+                </a:rPr>
+                <a:t>T</a:t>
+              </a:r>
+              <a:r>
+                <a:rPr lang="en-CH" sz="2800" dirty="0"/>
+                <a:t>[] data = ...</a:t>
+              </a:r>
+            </a:p>
+            <a:p>
+              <a:r>
+                <a:rPr lang="en-CH" sz="2800" dirty="0"/>
+                <a:t>    void push(</a:t>
+              </a:r>
+              <a:r>
+                <a:rPr lang="en-CH" sz="2800" dirty="0">
+                  <a:solidFill>
+                    <a:srgbClr val="FF0000"/>
+                  </a:solidFill>
+                </a:rPr>
+                <a:t>T</a:t>
+              </a:r>
+              <a:r>
+                <a:rPr lang="en-CH" sz="2800" dirty="0"/>
+                <a:t> </a:t>
+              </a:r>
+              <a:r>
+                <a:rPr lang="de-CH" sz="2800" dirty="0"/>
+                <a:t>e</a:t>
+              </a:r>
+              <a:r>
+                <a:rPr lang="en-CH" sz="2800" dirty="0"/>
+                <a:t>l</a:t>
+              </a:r>
+              <a:r>
+                <a:rPr lang="de-CH" sz="2800" dirty="0"/>
+                <a:t>e</a:t>
+              </a:r>
+              <a:r>
+                <a:rPr lang="en-CH" sz="2800" dirty="0"/>
+                <a:t>m</a:t>
+              </a:r>
+              <a:r>
+                <a:rPr lang="de-CH" sz="2800" dirty="0"/>
+                <a:t>e</a:t>
+              </a:r>
+              <a:r>
+                <a:rPr lang="en-CH" sz="2800" dirty="0"/>
+                <a:t>n</a:t>
+              </a:r>
+              <a:r>
+                <a:rPr lang="de-CH" sz="2800" dirty="0"/>
+                <a:t>t</a:t>
+              </a:r>
+              <a:r>
+                <a:rPr lang="en-CH" sz="2800" dirty="0"/>
+                <a:t>) {}</a:t>
+              </a:r>
+            </a:p>
+            <a:p>
+              <a:r>
+                <a:rPr lang="en-CH" sz="2800" dirty="0"/>
+                <a:t>    </a:t>
+              </a:r>
+              <a:r>
+                <a:rPr lang="en-CH" sz="2800" dirty="0">
+                  <a:solidFill>
+                    <a:srgbClr val="FF0000"/>
+                  </a:solidFill>
+                </a:rPr>
+                <a:t>T</a:t>
+              </a:r>
+              <a:r>
+                <a:rPr lang="en-CH" sz="2800" dirty="0"/>
+                <a:t> pop()	</a:t>
+              </a:r>
+            </a:p>
+            <a:p>
+              <a:r>
+                <a:rPr lang="en-CH" sz="2800" dirty="0"/>
+                <a:t>}</a:t>
+              </a:r>
+              <a:endParaRPr lang="de-CH" sz="2800" dirty="0"/>
+            </a:p>
+          </p:txBody>
+        </p:sp>
+        <p:sp>
+          <p:nvSpPr>
+            <p:cNvPr id="5" name="Callout: Line with Accent Bar 4">
+              <a:extLst>
+                <a:ext uri="{FF2B5EF4-FFF2-40B4-BE49-F238E27FC236}">
+                  <a16:creationId xmlns:a16="http://schemas.microsoft.com/office/drawing/2014/main" id="{21A17EC4-FE09-4BF0-959A-0F1ADA6488F9}"/>
+                </a:ext>
+              </a:extLst>
+            </p:cNvPr>
+            <p:cNvSpPr/>
+            <p:nvPr/>
+          </p:nvSpPr>
+          <p:spPr>
+            <a:xfrm flipH="1">
+              <a:off x="762000" y="968829"/>
+              <a:ext cx="1992085" cy="435428"/>
+            </a:xfrm>
+            <a:prstGeom prst="accentCallout1">
+              <a:avLst>
+                <a:gd name="adj1" fmla="val 18750"/>
+                <a:gd name="adj2" fmla="val -8333"/>
+                <a:gd name="adj3" fmla="val 192500"/>
+                <a:gd name="adj4" fmla="val -31330"/>
+              </a:avLst>
+            </a:prstGeom>
+          </p:spPr>
+          <p:style>
+            <a:lnRef idx="1">
+              <a:schemeClr val="accent3"/>
+            </a:lnRef>
+            <a:fillRef idx="2">
+              <a:schemeClr val="accent3"/>
+            </a:fillRef>
+            <a:effectRef idx="1">
+              <a:schemeClr val="accent3"/>
+            </a:effectRef>
+            <a:fontRef idx="minor">
+              <a:schemeClr val="dk1"/>
+            </a:fontRef>
+          </p:style>
+          <p:txBody>
+            <a:bodyPr rtlCol="0" anchor="ctr"/>
+            <a:lstStyle/>
+            <a:p>
+              <a:pPr algn="ctr"/>
+              <a:r>
+                <a:rPr lang="en-CH" dirty="0"/>
+                <a:t>G</a:t>
+              </a:r>
+              <a:r>
+                <a:rPr lang="de-CH" dirty="0"/>
+                <a:t>e</a:t>
+              </a:r>
+              <a:r>
+                <a:rPr lang="en-CH" dirty="0"/>
+                <a:t>n</a:t>
+              </a:r>
+              <a:r>
+                <a:rPr lang="de-CH" dirty="0"/>
+                <a:t>e</a:t>
+              </a:r>
+              <a:r>
+                <a:rPr lang="en-CH" dirty="0"/>
+                <a:t>r</a:t>
+              </a:r>
+              <a:r>
+                <a:rPr lang="de-CH" dirty="0"/>
+                <a:t>i</a:t>
+              </a:r>
+              <a:r>
+                <a:rPr lang="en-CH" dirty="0"/>
+                <a:t>s</a:t>
+              </a:r>
+              <a:r>
+                <a:rPr lang="de-CH" dirty="0"/>
+                <a:t>c</a:t>
+              </a:r>
+              <a:r>
+                <a:rPr lang="en-CH" dirty="0"/>
+                <a:t>h</a:t>
+              </a:r>
+              <a:r>
+                <a:rPr lang="de-CH" dirty="0"/>
+                <a:t>e</a:t>
+              </a:r>
+              <a:r>
+                <a:rPr lang="en-CH" dirty="0"/>
+                <a:t>r </a:t>
+              </a:r>
+              <a:r>
+                <a:rPr lang="de-CH" dirty="0"/>
+                <a:t>T</a:t>
+              </a:r>
+              <a:r>
+                <a:rPr lang="en-CH" dirty="0" err="1"/>
+                <a:t>yp</a:t>
+              </a:r>
+              <a:endParaRPr lang="de-CH" dirty="0"/>
+            </a:p>
+          </p:txBody>
+        </p:sp>
+        <p:sp>
+          <p:nvSpPr>
+            <p:cNvPr id="6" name="Callout: Line with Accent Bar 5">
+              <a:extLst>
+                <a:ext uri="{FF2B5EF4-FFF2-40B4-BE49-F238E27FC236}">
+                  <a16:creationId xmlns:a16="http://schemas.microsoft.com/office/drawing/2014/main" id="{75B8CFF7-2619-4529-BBEF-35C38F80CA8F}"/>
+                </a:ext>
+              </a:extLst>
+            </p:cNvPr>
+            <p:cNvSpPr/>
+            <p:nvPr/>
+          </p:nvSpPr>
+          <p:spPr>
+            <a:xfrm>
+              <a:off x="4958442" y="1110343"/>
+              <a:ext cx="1943100" cy="435428"/>
+            </a:xfrm>
+            <a:prstGeom prst="accentCallout1">
+              <a:avLst>
+                <a:gd name="adj1" fmla="val 18750"/>
+                <a:gd name="adj2" fmla="val -8333"/>
+                <a:gd name="adj3" fmla="val 141250"/>
+                <a:gd name="adj4" fmla="val -38052"/>
+              </a:avLst>
+            </a:prstGeom>
+          </p:spPr>
+          <p:style>
+            <a:lnRef idx="1">
+              <a:schemeClr val="accent3"/>
+            </a:lnRef>
+            <a:fillRef idx="2">
+              <a:schemeClr val="accent3"/>
+            </a:fillRef>
+            <a:effectRef idx="1">
+              <a:schemeClr val="accent3"/>
+            </a:effectRef>
+            <a:fontRef idx="minor">
+              <a:schemeClr val="dk1"/>
+            </a:fontRef>
+          </p:style>
+          <p:txBody>
+            <a:bodyPr rtlCol="0" anchor="ctr"/>
+            <a:lstStyle/>
+            <a:p>
+              <a:pPr algn="ctr"/>
+              <a:r>
+                <a:rPr lang="de-CH" dirty="0"/>
+                <a:t>T</a:t>
+              </a:r>
+              <a:r>
+                <a:rPr lang="en-CH" dirty="0"/>
+                <a:t>y</a:t>
+              </a:r>
+              <a:r>
+                <a:rPr lang="de-CH" dirty="0"/>
+                <a:t>p</a:t>
+              </a:r>
+              <a:r>
+                <a:rPr lang="en-CH" dirty="0"/>
+                <a:t>p</a:t>
+              </a:r>
+              <a:r>
+                <a:rPr lang="de-CH" dirty="0"/>
+                <a:t>a</a:t>
+              </a:r>
+              <a:r>
+                <a:rPr lang="en-CH" dirty="0"/>
+                <a:t>r</a:t>
+              </a:r>
+              <a:r>
+                <a:rPr lang="de-CH" dirty="0"/>
+                <a:t>a</a:t>
+              </a:r>
+              <a:r>
+                <a:rPr lang="en-CH" dirty="0"/>
+                <a:t>m</a:t>
+              </a:r>
+              <a:r>
+                <a:rPr lang="de-CH" dirty="0"/>
+                <a:t>e</a:t>
+              </a:r>
+              <a:r>
+                <a:rPr lang="en-CH" dirty="0"/>
+                <a:t>t</a:t>
+              </a:r>
+              <a:r>
+                <a:rPr lang="de-CH" dirty="0"/>
+                <a:t>e</a:t>
+              </a:r>
+              <a:r>
+                <a:rPr lang="en-CH" dirty="0"/>
+                <a:t>r</a:t>
+              </a:r>
+              <a:endParaRPr lang="de-CH" dirty="0"/>
+            </a:p>
+          </p:txBody>
+        </p:sp>
+      </p:grpSp>
     </p:spTree>
     <p:extLst>
       <p:ext uri="{BB962C8B-B14F-4D97-AF65-F5344CB8AC3E}">
         <p14:creationId xmlns:p14="http://schemas.microsoft.com/office/powerpoint/2010/main" val="3834801227"/>
+      </p:ext>
+    </p:extLst>
+  </p:cSld>
+  <p:clrMapOvr>
+    <a:masterClrMapping/>
+  </p:clrMapOvr>
+</p:sld>
+</file>
+
+<file path=ppt/slides/slide2.xml><?xml version="1.0" encoding="utf-8"?>
+<p:sld xmlns:a="http://schemas.openxmlformats.org/drawingml/2006/main" xmlns:r="http://schemas.openxmlformats.org/officeDocument/2006/relationships" xmlns:p="http://schemas.openxmlformats.org/presentationml/2006/main">
+  <p:cSld>
+    <p:spTree>
+      <p:nvGrpSpPr>
+        <p:cNvPr id="1" name=""/>
+        <p:cNvGrpSpPr/>
+        <p:nvPr/>
+      </p:nvGrpSpPr>
+      <p:grpSpPr>
+        <a:xfrm>
+          <a:off x="0" y="0"/>
+          <a:ext cx="0" cy="0"/>
+          <a:chOff x="0" y="0"/>
+          <a:chExt cx="0" cy="0"/>
+        </a:xfrm>
+      </p:grpSpPr>
+      <p:sp>
+        <p:nvSpPr>
+          <p:cNvPr id="9" name="Rectangle 8">
+            <a:extLst>
+              <a:ext uri="{FF2B5EF4-FFF2-40B4-BE49-F238E27FC236}">
+                <a16:creationId xmlns:a16="http://schemas.microsoft.com/office/drawing/2014/main" id="{C44DF923-5DF4-4839-8F39-0193D4645C6D}"/>
+              </a:ext>
+            </a:extLst>
+          </p:cNvPr>
+          <p:cNvSpPr/>
+          <p:nvPr/>
+        </p:nvSpPr>
+        <p:spPr>
+          <a:xfrm>
+            <a:off x="6778754" y="1127760"/>
+            <a:ext cx="5010912" cy="3352800"/>
+          </a:xfrm>
+          <a:prstGeom prst="rect">
+            <a:avLst/>
+          </a:prstGeom>
+        </p:spPr>
+        <p:style>
+          <a:lnRef idx="1">
+            <a:schemeClr val="accent3"/>
+          </a:lnRef>
+          <a:fillRef idx="2">
+            <a:schemeClr val="accent3"/>
+          </a:fillRef>
+          <a:effectRef idx="1">
+            <a:schemeClr val="accent3"/>
+          </a:effectRef>
+          <a:fontRef idx="minor">
+            <a:schemeClr val="dk1"/>
+          </a:fontRef>
+        </p:style>
+        <p:txBody>
+          <a:bodyPr rtlCol="0" anchor="t" anchorCtr="0"/>
+          <a:lstStyle/>
+          <a:p>
+            <a:r>
+              <a:rPr lang="de-CH" sz="2800" dirty="0"/>
+              <a:t>R</a:t>
+            </a:r>
+            <a:r>
+              <a:rPr lang="en-CH" sz="2800" dirty="0"/>
+              <a:t>o</a:t>
+            </a:r>
+            <a:r>
+              <a:rPr lang="de-CH" sz="2800" dirty="0"/>
+              <a:t>h</a:t>
+            </a:r>
+            <a:r>
+              <a:rPr lang="en-CH" sz="2800" dirty="0"/>
+              <a:t>t</a:t>
+            </a:r>
+            <a:r>
+              <a:rPr lang="de-CH" sz="2800" dirty="0"/>
+              <a:t>y</a:t>
+            </a:r>
+            <a:r>
+              <a:rPr lang="en-CH" sz="2800" dirty="0"/>
+              <a:t>p</a:t>
+            </a:r>
+            <a:endParaRPr lang="de-CH" sz="2800" dirty="0"/>
+          </a:p>
+        </p:txBody>
+      </p:sp>
+      <p:sp>
+        <p:nvSpPr>
+          <p:cNvPr id="2" name="Rectangle 1">
+            <a:extLst>
+              <a:ext uri="{FF2B5EF4-FFF2-40B4-BE49-F238E27FC236}">
+                <a16:creationId xmlns:a16="http://schemas.microsoft.com/office/drawing/2014/main" id="{55C30E2F-9F69-4FFC-BF5A-9881B3D56DDA}"/>
+              </a:ext>
+            </a:extLst>
+          </p:cNvPr>
+          <p:cNvSpPr/>
+          <p:nvPr/>
+        </p:nvSpPr>
+        <p:spPr>
+          <a:xfrm>
+            <a:off x="518160" y="1127760"/>
+            <a:ext cx="4895088" cy="3352800"/>
+          </a:xfrm>
+          <a:prstGeom prst="rect">
+            <a:avLst/>
+          </a:prstGeom>
+        </p:spPr>
+        <p:style>
+          <a:lnRef idx="1">
+            <a:schemeClr val="accent3"/>
+          </a:lnRef>
+          <a:fillRef idx="2">
+            <a:schemeClr val="accent3"/>
+          </a:fillRef>
+          <a:effectRef idx="1">
+            <a:schemeClr val="accent3"/>
+          </a:effectRef>
+          <a:fontRef idx="minor">
+            <a:schemeClr val="dk1"/>
+          </a:fontRef>
+        </p:style>
+        <p:txBody>
+          <a:bodyPr rtlCol="0" anchor="t" anchorCtr="0"/>
+          <a:lstStyle/>
+          <a:p>
+            <a:r>
+              <a:rPr lang="en-CH" sz="2800" dirty="0"/>
+              <a:t>G</a:t>
+            </a:r>
+            <a:r>
+              <a:rPr lang="de-CH" sz="2800" dirty="0"/>
+              <a:t>e</a:t>
+            </a:r>
+            <a:r>
+              <a:rPr lang="en-CH" sz="2800" dirty="0"/>
+              <a:t>n</a:t>
+            </a:r>
+            <a:r>
+              <a:rPr lang="de-CH" sz="2800" dirty="0"/>
+              <a:t>e</a:t>
+            </a:r>
+            <a:r>
+              <a:rPr lang="en-CH" sz="2800" dirty="0"/>
+              <a:t>r</a:t>
+            </a:r>
+            <a:r>
+              <a:rPr lang="de-CH" sz="2800" dirty="0"/>
+              <a:t>i</a:t>
+            </a:r>
+            <a:r>
+              <a:rPr lang="en-CH" sz="2800" dirty="0"/>
+              <a:t>s</a:t>
+            </a:r>
+            <a:r>
+              <a:rPr lang="de-CH" sz="2800" dirty="0"/>
+              <a:t>c</a:t>
+            </a:r>
+            <a:r>
+              <a:rPr lang="en-CH" sz="2800" dirty="0"/>
+              <a:t>h</a:t>
+            </a:r>
+            <a:r>
+              <a:rPr lang="de-CH" sz="2800" dirty="0"/>
+              <a:t>e</a:t>
+            </a:r>
+            <a:r>
+              <a:rPr lang="en-CH" sz="2800" dirty="0"/>
+              <a:t>r </a:t>
+            </a:r>
+            <a:r>
+              <a:rPr lang="de-CH" sz="2800" dirty="0"/>
+              <a:t>T</a:t>
+            </a:r>
+            <a:r>
+              <a:rPr lang="en-CH" sz="2800" dirty="0"/>
+              <a:t>y</a:t>
+            </a:r>
+            <a:r>
+              <a:rPr lang="de-CH" sz="2800" dirty="0"/>
+              <a:t>p</a:t>
+            </a:r>
+          </a:p>
+        </p:txBody>
+      </p:sp>
+      <p:sp>
+        <p:nvSpPr>
+          <p:cNvPr id="4" name="TextBox 3">
+            <a:extLst>
+              <a:ext uri="{FF2B5EF4-FFF2-40B4-BE49-F238E27FC236}">
+                <a16:creationId xmlns:a16="http://schemas.microsoft.com/office/drawing/2014/main" id="{C65B17C5-D5F7-4E92-ABEF-E258D91984B9}"/>
+              </a:ext>
+            </a:extLst>
+          </p:cNvPr>
+          <p:cNvSpPr txBox="1"/>
+          <p:nvPr/>
+        </p:nvSpPr>
+        <p:spPr>
+          <a:xfrm>
+            <a:off x="957943" y="1852313"/>
+            <a:ext cx="3906665" cy="2246769"/>
+          </a:xfrm>
+          <a:prstGeom prst="rect">
+            <a:avLst/>
+          </a:prstGeom>
+          <a:solidFill>
+            <a:schemeClr val="bg1"/>
+          </a:solidFill>
+        </p:spPr>
+        <p:txBody>
+          <a:bodyPr wrap="square" rtlCol="0">
+            <a:spAutoFit/>
+          </a:bodyPr>
+          <a:lstStyle/>
+          <a:p>
+            <a:r>
+              <a:rPr lang="en-CH" sz="2800" dirty="0"/>
+              <a:t>c</a:t>
+            </a:r>
+            <a:r>
+              <a:rPr lang="de-CH" sz="2800" dirty="0"/>
+              <a:t>l</a:t>
+            </a:r>
+            <a:r>
+              <a:rPr lang="en-CH" sz="2800" dirty="0"/>
+              <a:t>a</a:t>
+            </a:r>
+            <a:r>
+              <a:rPr lang="de-CH" sz="2800" dirty="0"/>
+              <a:t>s</a:t>
+            </a:r>
+            <a:r>
+              <a:rPr lang="en-CH" sz="2800" dirty="0"/>
+              <a:t>s </a:t>
+            </a:r>
+            <a:r>
+              <a:rPr lang="de-CH" sz="2800" b="1" dirty="0"/>
+              <a:t>S</a:t>
+            </a:r>
+            <a:r>
+              <a:rPr lang="en-CH" sz="2800" b="1" dirty="0"/>
+              <a:t>t</a:t>
+            </a:r>
+            <a:r>
+              <a:rPr lang="de-CH" sz="2800" b="1" dirty="0"/>
+              <a:t>a</a:t>
+            </a:r>
+            <a:r>
+              <a:rPr lang="en-CH" sz="2800" b="1" dirty="0"/>
+              <a:t>c</a:t>
+            </a:r>
+            <a:r>
+              <a:rPr lang="de-CH" sz="2800" b="1" dirty="0"/>
+              <a:t>k</a:t>
+            </a:r>
+            <a:r>
+              <a:rPr lang="en-CH" sz="2800" dirty="0">
+                <a:solidFill>
+                  <a:srgbClr val="FF0000"/>
+                </a:solidFill>
+              </a:rPr>
+              <a:t>&lt;</a:t>
+            </a:r>
+            <a:r>
+              <a:rPr lang="de-CH" sz="2800" dirty="0">
+                <a:solidFill>
+                  <a:srgbClr val="FF0000"/>
+                </a:solidFill>
+              </a:rPr>
+              <a:t>T</a:t>
+            </a:r>
+            <a:r>
+              <a:rPr lang="en-CH" sz="2800" dirty="0">
+                <a:solidFill>
+                  <a:srgbClr val="FF0000"/>
+                </a:solidFill>
+              </a:rPr>
+              <a:t>&gt;</a:t>
+            </a:r>
+            <a:r>
+              <a:rPr lang="en-CH" sz="2800" dirty="0"/>
+              <a:t> {</a:t>
+            </a:r>
+          </a:p>
+          <a:p>
+            <a:r>
+              <a:rPr lang="en-CH" sz="2800" dirty="0"/>
+              <a:t>    </a:t>
+            </a:r>
+            <a:r>
+              <a:rPr lang="de-CH" sz="2800" dirty="0">
+                <a:solidFill>
+                  <a:srgbClr val="FF0000"/>
+                </a:solidFill>
+              </a:rPr>
+              <a:t>T</a:t>
+            </a:r>
+            <a:r>
+              <a:rPr lang="en-CH" sz="2800" dirty="0"/>
+              <a:t>[] data = ...</a:t>
+            </a:r>
+          </a:p>
+          <a:p>
+            <a:r>
+              <a:rPr lang="en-CH" sz="2800" dirty="0"/>
+              <a:t>    void push(</a:t>
+            </a:r>
+            <a:r>
+              <a:rPr lang="en-CH" sz="2800" dirty="0">
+                <a:solidFill>
+                  <a:srgbClr val="FF0000"/>
+                </a:solidFill>
+              </a:rPr>
+              <a:t>T</a:t>
+            </a:r>
+            <a:r>
+              <a:rPr lang="en-CH" sz="2800" dirty="0"/>
+              <a:t> </a:t>
+            </a:r>
+            <a:r>
+              <a:rPr lang="de-CH" sz="2800" dirty="0"/>
+              <a:t>e</a:t>
+            </a:r>
+            <a:r>
+              <a:rPr lang="en-CH" sz="2800" dirty="0"/>
+              <a:t>l</a:t>
+            </a:r>
+            <a:r>
+              <a:rPr lang="de-CH" sz="2800" dirty="0"/>
+              <a:t>e</a:t>
+            </a:r>
+            <a:r>
+              <a:rPr lang="en-CH" sz="2800" dirty="0"/>
+              <a:t>m</a:t>
+            </a:r>
+            <a:r>
+              <a:rPr lang="de-CH" sz="2800" dirty="0"/>
+              <a:t>e</a:t>
+            </a:r>
+            <a:r>
+              <a:rPr lang="en-CH" sz="2800" dirty="0"/>
+              <a:t>n</a:t>
+            </a:r>
+            <a:r>
+              <a:rPr lang="de-CH" sz="2800" dirty="0"/>
+              <a:t>t</a:t>
+            </a:r>
+            <a:r>
+              <a:rPr lang="en-CH" sz="2800" dirty="0"/>
+              <a:t>) {}</a:t>
+            </a:r>
+          </a:p>
+          <a:p>
+            <a:r>
+              <a:rPr lang="en-CH" sz="2800" dirty="0"/>
+              <a:t>    </a:t>
+            </a:r>
+            <a:r>
+              <a:rPr lang="en-CH" sz="2800" dirty="0">
+                <a:solidFill>
+                  <a:srgbClr val="FF0000"/>
+                </a:solidFill>
+              </a:rPr>
+              <a:t>T</a:t>
+            </a:r>
+            <a:r>
+              <a:rPr lang="en-CH" sz="2800" dirty="0"/>
+              <a:t> pop()	</a:t>
+            </a:r>
+          </a:p>
+          <a:p>
+            <a:r>
+              <a:rPr lang="en-CH" sz="2800" dirty="0"/>
+              <a:t>}</a:t>
+            </a:r>
+            <a:endParaRPr lang="de-CH" sz="2800" dirty="0"/>
+          </a:p>
+        </p:txBody>
+      </p:sp>
+      <p:sp>
+        <p:nvSpPr>
+          <p:cNvPr id="8" name="TextBox 7">
+            <a:extLst>
+              <a:ext uri="{FF2B5EF4-FFF2-40B4-BE49-F238E27FC236}">
+                <a16:creationId xmlns:a16="http://schemas.microsoft.com/office/drawing/2014/main" id="{0C391488-746E-423F-ADF7-75F8058D9913}"/>
+              </a:ext>
+            </a:extLst>
+          </p:cNvPr>
+          <p:cNvSpPr txBox="1"/>
+          <p:nvPr/>
+        </p:nvSpPr>
+        <p:spPr>
+          <a:xfrm>
+            <a:off x="6974697" y="1852313"/>
+            <a:ext cx="4686953" cy="2246769"/>
+          </a:xfrm>
+          <a:prstGeom prst="rect">
+            <a:avLst/>
+          </a:prstGeom>
+          <a:solidFill>
+            <a:schemeClr val="bg1"/>
+          </a:solidFill>
+        </p:spPr>
+        <p:txBody>
+          <a:bodyPr wrap="square" rtlCol="0">
+            <a:spAutoFit/>
+          </a:bodyPr>
+          <a:lstStyle/>
+          <a:p>
+            <a:r>
+              <a:rPr lang="en-CH" sz="2800" dirty="0"/>
+              <a:t>c</a:t>
+            </a:r>
+            <a:r>
+              <a:rPr lang="de-CH" sz="2800" dirty="0"/>
+              <a:t>l</a:t>
+            </a:r>
+            <a:r>
+              <a:rPr lang="en-CH" sz="2800" dirty="0"/>
+              <a:t>a</a:t>
+            </a:r>
+            <a:r>
+              <a:rPr lang="de-CH" sz="2800" dirty="0"/>
+              <a:t>s</a:t>
+            </a:r>
+            <a:r>
+              <a:rPr lang="en-CH" sz="2800" dirty="0"/>
+              <a:t>s </a:t>
+            </a:r>
+            <a:r>
+              <a:rPr lang="de-CH" sz="2800" b="1" dirty="0"/>
+              <a:t>S</a:t>
+            </a:r>
+            <a:r>
+              <a:rPr lang="en-CH" sz="2800" b="1" dirty="0"/>
+              <a:t>t</a:t>
+            </a:r>
+            <a:r>
+              <a:rPr lang="de-CH" sz="2800" b="1" dirty="0"/>
+              <a:t>a</a:t>
+            </a:r>
+            <a:r>
+              <a:rPr lang="en-CH" sz="2800" b="1" dirty="0"/>
+              <a:t>c</a:t>
+            </a:r>
+            <a:r>
+              <a:rPr lang="de-CH" sz="2800" b="1" dirty="0"/>
+              <a:t>k</a:t>
+            </a:r>
+            <a:r>
+              <a:rPr lang="en-CH" sz="2800" dirty="0"/>
+              <a:t> {</a:t>
+            </a:r>
+          </a:p>
+          <a:p>
+            <a:r>
+              <a:rPr lang="en-CH" sz="2800" dirty="0"/>
+              <a:t>    </a:t>
+            </a:r>
+            <a:r>
+              <a:rPr lang="en-CH" sz="2800" dirty="0">
+                <a:solidFill>
+                  <a:srgbClr val="FF0000"/>
+                </a:solidFill>
+              </a:rPr>
+              <a:t>Object</a:t>
+            </a:r>
+            <a:r>
+              <a:rPr lang="en-CH" sz="2800" dirty="0"/>
+              <a:t>[] data = ...</a:t>
+            </a:r>
+          </a:p>
+          <a:p>
+            <a:r>
+              <a:rPr lang="en-CH" sz="2800" dirty="0"/>
+              <a:t>    void push(</a:t>
+            </a:r>
+            <a:r>
+              <a:rPr lang="en-CH" sz="2800" dirty="0">
+                <a:solidFill>
+                  <a:srgbClr val="FF0000"/>
+                </a:solidFill>
+              </a:rPr>
+              <a:t>Object</a:t>
+            </a:r>
+            <a:r>
+              <a:rPr lang="en-CH" sz="2800" dirty="0"/>
+              <a:t> </a:t>
+            </a:r>
+            <a:r>
+              <a:rPr lang="de-CH" sz="2800" dirty="0"/>
+              <a:t>e</a:t>
+            </a:r>
+            <a:r>
+              <a:rPr lang="en-CH" sz="2800" dirty="0"/>
+              <a:t>l</a:t>
+            </a:r>
+            <a:r>
+              <a:rPr lang="de-CH" sz="2800" dirty="0"/>
+              <a:t>e</a:t>
+            </a:r>
+            <a:r>
+              <a:rPr lang="en-CH" sz="2800" dirty="0"/>
+              <a:t>m</a:t>
+            </a:r>
+            <a:r>
+              <a:rPr lang="de-CH" sz="2800" dirty="0"/>
+              <a:t>e</a:t>
+            </a:r>
+            <a:r>
+              <a:rPr lang="en-CH" sz="2800" dirty="0"/>
+              <a:t>n</a:t>
+            </a:r>
+            <a:r>
+              <a:rPr lang="de-CH" sz="2800" dirty="0"/>
+              <a:t>t</a:t>
+            </a:r>
+            <a:r>
+              <a:rPr lang="en-CH" sz="2800" dirty="0"/>
+              <a:t>) {}</a:t>
+            </a:r>
+          </a:p>
+          <a:p>
+            <a:r>
+              <a:rPr lang="en-CH" sz="2800" dirty="0"/>
+              <a:t>    </a:t>
+            </a:r>
+            <a:r>
+              <a:rPr lang="en-CH" sz="2800" dirty="0">
+                <a:solidFill>
+                  <a:srgbClr val="FF0000"/>
+                </a:solidFill>
+              </a:rPr>
+              <a:t>Object</a:t>
+            </a:r>
+            <a:r>
+              <a:rPr lang="en-CH" sz="2800" dirty="0"/>
+              <a:t> pop()	</a:t>
+            </a:r>
+          </a:p>
+          <a:p>
+            <a:r>
+              <a:rPr lang="en-CH" sz="2800" dirty="0"/>
+              <a:t>}</a:t>
+            </a:r>
+            <a:endParaRPr lang="de-CH" sz="2800" dirty="0"/>
+          </a:p>
+        </p:txBody>
+      </p:sp>
+      <p:sp>
+        <p:nvSpPr>
+          <p:cNvPr id="10" name="Arrow: Right 9">
+            <a:extLst>
+              <a:ext uri="{FF2B5EF4-FFF2-40B4-BE49-F238E27FC236}">
+                <a16:creationId xmlns:a16="http://schemas.microsoft.com/office/drawing/2014/main" id="{0A825582-B643-4642-AD39-703590CF0B83}"/>
+              </a:ext>
+            </a:extLst>
+          </p:cNvPr>
+          <p:cNvSpPr/>
+          <p:nvPr/>
+        </p:nvSpPr>
+        <p:spPr>
+          <a:xfrm>
+            <a:off x="5516880" y="2474976"/>
+            <a:ext cx="1158240" cy="420624"/>
+          </a:xfrm>
+          <a:prstGeom prst="rightArrow">
+            <a:avLst/>
+          </a:prstGeom>
+        </p:spPr>
+        <p:style>
+          <a:lnRef idx="2">
+            <a:schemeClr val="dk1"/>
+          </a:lnRef>
+          <a:fillRef idx="1">
+            <a:schemeClr val="lt1"/>
+          </a:fillRef>
+          <a:effectRef idx="0">
+            <a:schemeClr val="dk1"/>
+          </a:effectRef>
+          <a:fontRef idx="minor">
+            <a:schemeClr val="dk1"/>
+          </a:fontRef>
+        </p:style>
+        <p:txBody>
+          <a:bodyPr rtlCol="0" anchor="ctr"/>
+          <a:lstStyle/>
+          <a:p>
+            <a:pPr algn="ctr"/>
+            <a:r>
+              <a:rPr lang="en-CH" dirty="0"/>
+              <a:t>C</a:t>
+            </a:r>
+            <a:r>
+              <a:rPr lang="de-CH" dirty="0"/>
+              <a:t>o</a:t>
+            </a:r>
+            <a:r>
+              <a:rPr lang="en-CH" dirty="0"/>
+              <a:t>m</a:t>
+            </a:r>
+            <a:r>
+              <a:rPr lang="de-CH" dirty="0"/>
+              <a:t>p</a:t>
+            </a:r>
+            <a:r>
+              <a:rPr lang="en-CH" dirty="0" err="1"/>
+              <a:t>i</a:t>
+            </a:r>
+            <a:r>
+              <a:rPr lang="de-CH" dirty="0"/>
+              <a:t>l</a:t>
+            </a:r>
+            <a:r>
+              <a:rPr lang="en-CH" dirty="0"/>
+              <a:t>e</a:t>
+            </a:r>
+            <a:r>
+              <a:rPr lang="de-CH" dirty="0"/>
+              <a:t>r</a:t>
+            </a:r>
+          </a:p>
+        </p:txBody>
+      </p:sp>
+    </p:spTree>
+    <p:extLst>
+      <p:ext uri="{BB962C8B-B14F-4D97-AF65-F5344CB8AC3E}">
+        <p14:creationId xmlns:p14="http://schemas.microsoft.com/office/powerpoint/2010/main" val="2829865486"/>
       </p:ext>
     </p:extLst>
   </p:cSld>

</xml_diff>

<commit_message>
added slides for klassenbibliothek
</commit_message>
<xml_diff>
--- a/slides/images/graphics.pptx
+++ b/slides/images/graphics.pptx
@@ -7,6 +7,8 @@
   <p:sldIdLst>
     <p:sldId id="256" r:id="rId2"/>
     <p:sldId id="257" r:id="rId3"/>
+    <p:sldId id="258" r:id="rId4"/>
+    <p:sldId id="259" r:id="rId5"/>
   </p:sldIdLst>
   <p:sldSz cx="12192000" cy="6858000"/>
   <p:notesSz cx="6858000" cy="9144000"/>
@@ -262,7 +264,7 @@
           <a:p>
             <a:fld id="{95FFB93D-DBB6-4626-8770-6183B8221187}" type="datetimeFigureOut">
               <a:rPr lang="de-CH" smtClean="0"/>
-              <a:t>23.11.2018</a:t>
+              <a:t>12.12.2018</a:t>
             </a:fld>
             <a:endParaRPr lang="de-CH"/>
           </a:p>
@@ -462,7 +464,7 @@
           <a:p>
             <a:fld id="{95FFB93D-DBB6-4626-8770-6183B8221187}" type="datetimeFigureOut">
               <a:rPr lang="de-CH" smtClean="0"/>
-              <a:t>23.11.2018</a:t>
+              <a:t>12.12.2018</a:t>
             </a:fld>
             <a:endParaRPr lang="de-CH"/>
           </a:p>
@@ -672,7 +674,7 @@
           <a:p>
             <a:fld id="{95FFB93D-DBB6-4626-8770-6183B8221187}" type="datetimeFigureOut">
               <a:rPr lang="de-CH" smtClean="0"/>
-              <a:t>23.11.2018</a:t>
+              <a:t>12.12.2018</a:t>
             </a:fld>
             <a:endParaRPr lang="de-CH"/>
           </a:p>
@@ -872,7 +874,7 @@
           <a:p>
             <a:fld id="{95FFB93D-DBB6-4626-8770-6183B8221187}" type="datetimeFigureOut">
               <a:rPr lang="de-CH" smtClean="0"/>
-              <a:t>23.11.2018</a:t>
+              <a:t>12.12.2018</a:t>
             </a:fld>
             <a:endParaRPr lang="de-CH"/>
           </a:p>
@@ -1148,7 +1150,7 @@
           <a:p>
             <a:fld id="{95FFB93D-DBB6-4626-8770-6183B8221187}" type="datetimeFigureOut">
               <a:rPr lang="de-CH" smtClean="0"/>
-              <a:t>23.11.2018</a:t>
+              <a:t>12.12.2018</a:t>
             </a:fld>
             <a:endParaRPr lang="de-CH"/>
           </a:p>
@@ -1416,7 +1418,7 @@
           <a:p>
             <a:fld id="{95FFB93D-DBB6-4626-8770-6183B8221187}" type="datetimeFigureOut">
               <a:rPr lang="de-CH" smtClean="0"/>
-              <a:t>23.11.2018</a:t>
+              <a:t>12.12.2018</a:t>
             </a:fld>
             <a:endParaRPr lang="de-CH"/>
           </a:p>
@@ -1831,7 +1833,7 @@
           <a:p>
             <a:fld id="{95FFB93D-DBB6-4626-8770-6183B8221187}" type="datetimeFigureOut">
               <a:rPr lang="de-CH" smtClean="0"/>
-              <a:t>23.11.2018</a:t>
+              <a:t>12.12.2018</a:t>
             </a:fld>
             <a:endParaRPr lang="de-CH"/>
           </a:p>
@@ -1973,7 +1975,7 @@
           <a:p>
             <a:fld id="{95FFB93D-DBB6-4626-8770-6183B8221187}" type="datetimeFigureOut">
               <a:rPr lang="de-CH" smtClean="0"/>
-              <a:t>23.11.2018</a:t>
+              <a:t>12.12.2018</a:t>
             </a:fld>
             <a:endParaRPr lang="de-CH"/>
           </a:p>
@@ -2086,7 +2088,7 @@
           <a:p>
             <a:fld id="{95FFB93D-DBB6-4626-8770-6183B8221187}" type="datetimeFigureOut">
               <a:rPr lang="de-CH" smtClean="0"/>
-              <a:t>23.11.2018</a:t>
+              <a:t>12.12.2018</a:t>
             </a:fld>
             <a:endParaRPr lang="de-CH"/>
           </a:p>
@@ -2399,7 +2401,7 @@
           <a:p>
             <a:fld id="{95FFB93D-DBB6-4626-8770-6183B8221187}" type="datetimeFigureOut">
               <a:rPr lang="de-CH" smtClean="0"/>
-              <a:t>23.11.2018</a:t>
+              <a:t>12.12.2018</a:t>
             </a:fld>
             <a:endParaRPr lang="de-CH"/>
           </a:p>
@@ -2688,7 +2690,7 @@
           <a:p>
             <a:fld id="{95FFB93D-DBB6-4626-8770-6183B8221187}" type="datetimeFigureOut">
               <a:rPr lang="de-CH" smtClean="0"/>
-              <a:t>23.11.2018</a:t>
+              <a:t>12.12.2018</a:t>
             </a:fld>
             <a:endParaRPr lang="de-CH"/>
           </a:p>
@@ -2931,7 +2933,7 @@
           <a:p>
             <a:fld id="{95FFB93D-DBB6-4626-8770-6183B8221187}" type="datetimeFigureOut">
               <a:rPr lang="de-CH" smtClean="0"/>
-              <a:t>23.11.2018</a:t>
+              <a:t>12.12.2018</a:t>
             </a:fld>
             <a:endParaRPr lang="de-CH"/>
           </a:p>
@@ -4406,6 +4408,1891 @@
 </p:sld>
 </file>
 
+<file path=ppt/slides/slide3.xml><?xml version="1.0" encoding="utf-8"?>
+<p:sld xmlns:a="http://schemas.openxmlformats.org/drawingml/2006/main" xmlns:r="http://schemas.openxmlformats.org/officeDocument/2006/relationships" xmlns:p="http://schemas.openxmlformats.org/presentationml/2006/main">
+  <p:cSld>
+    <p:spTree>
+      <p:nvGrpSpPr>
+        <p:cNvPr id="1" name=""/>
+        <p:cNvGrpSpPr/>
+        <p:nvPr/>
+      </p:nvGrpSpPr>
+      <p:grpSpPr>
+        <a:xfrm>
+          <a:off x="0" y="0"/>
+          <a:ext cx="0" cy="0"/>
+          <a:chOff x="0" y="0"/>
+          <a:chExt cx="0" cy="0"/>
+        </a:xfrm>
+      </p:grpSpPr>
+      <p:sp>
+        <p:nvSpPr>
+          <p:cNvPr id="2" name="Rectangle 1">
+            <a:extLst>
+              <a:ext uri="{FF2B5EF4-FFF2-40B4-BE49-F238E27FC236}">
+                <a16:creationId xmlns:a16="http://schemas.microsoft.com/office/drawing/2014/main" id="{8B143DCA-F858-47C6-9B06-D4F46B37A03D}"/>
+              </a:ext>
+            </a:extLst>
+          </p:cNvPr>
+          <p:cNvSpPr/>
+          <p:nvPr/>
+        </p:nvSpPr>
+        <p:spPr>
+          <a:xfrm>
+            <a:off x="3486751" y="967340"/>
+            <a:ext cx="1838425" cy="885524"/>
+          </a:xfrm>
+          <a:prstGeom prst="rect">
+            <a:avLst/>
+          </a:prstGeom>
+        </p:spPr>
+        <p:style>
+          <a:lnRef idx="2">
+            <a:schemeClr val="dk1"/>
+          </a:lnRef>
+          <a:fillRef idx="1">
+            <a:schemeClr val="lt1"/>
+          </a:fillRef>
+          <a:effectRef idx="0">
+            <a:schemeClr val="dk1"/>
+          </a:effectRef>
+          <a:fontRef idx="minor">
+            <a:schemeClr val="dk1"/>
+          </a:fontRef>
+        </p:style>
+        <p:txBody>
+          <a:bodyPr rtlCol="0" anchor="ctr"/>
+          <a:lstStyle/>
+          <a:p>
+            <a:pPr algn="ctr"/>
+            <a:r>
+              <a:rPr lang="en-CH" dirty="0"/>
+              <a:t>L</a:t>
+            </a:r>
+            <a:r>
+              <a:rPr lang="de-CH" dirty="0"/>
+              <a:t>i</a:t>
+            </a:r>
+            <a:r>
+              <a:rPr lang="en-CH" dirty="0"/>
+              <a:t>s</a:t>
+            </a:r>
+            <a:r>
+              <a:rPr lang="de-CH" dirty="0"/>
+              <a:t>t</a:t>
+            </a:r>
+            <a:r>
+              <a:rPr lang="en-CH" dirty="0"/>
+              <a:t>&lt;Animal&gt;</a:t>
+            </a:r>
+            <a:endParaRPr lang="de-CH" dirty="0"/>
+          </a:p>
+        </p:txBody>
+      </p:sp>
+      <p:sp>
+        <p:nvSpPr>
+          <p:cNvPr id="3" name="Rectangle 2">
+            <a:extLst>
+              <a:ext uri="{FF2B5EF4-FFF2-40B4-BE49-F238E27FC236}">
+                <a16:creationId xmlns:a16="http://schemas.microsoft.com/office/drawing/2014/main" id="{22DC6FF3-14EC-4711-9109-17FD84B9B183}"/>
+              </a:ext>
+            </a:extLst>
+          </p:cNvPr>
+          <p:cNvSpPr/>
+          <p:nvPr/>
+        </p:nvSpPr>
+        <p:spPr>
+          <a:xfrm>
+            <a:off x="3486750" y="3102544"/>
+            <a:ext cx="1838425" cy="885524"/>
+          </a:xfrm>
+          <a:prstGeom prst="rect">
+            <a:avLst/>
+          </a:prstGeom>
+        </p:spPr>
+        <p:style>
+          <a:lnRef idx="2">
+            <a:schemeClr val="dk1"/>
+          </a:lnRef>
+          <a:fillRef idx="1">
+            <a:schemeClr val="lt1"/>
+          </a:fillRef>
+          <a:effectRef idx="0">
+            <a:schemeClr val="dk1"/>
+          </a:effectRef>
+          <a:fontRef idx="minor">
+            <a:schemeClr val="dk1"/>
+          </a:fontRef>
+        </p:style>
+        <p:txBody>
+          <a:bodyPr rtlCol="0" anchor="ctr"/>
+          <a:lstStyle/>
+          <a:p>
+            <a:pPr algn="ctr"/>
+            <a:r>
+              <a:rPr lang="en-CH" dirty="0"/>
+              <a:t>L</a:t>
+            </a:r>
+            <a:r>
+              <a:rPr lang="de-CH" dirty="0"/>
+              <a:t>i</a:t>
+            </a:r>
+            <a:r>
+              <a:rPr lang="en-CH" dirty="0"/>
+              <a:t>s</a:t>
+            </a:r>
+            <a:r>
+              <a:rPr lang="de-CH" dirty="0"/>
+              <a:t>t</a:t>
+            </a:r>
+            <a:r>
+              <a:rPr lang="en-CH" dirty="0"/>
+              <a:t>&lt;</a:t>
+            </a:r>
+            <a:r>
+              <a:rPr lang="de-CH" dirty="0"/>
+              <a:t>D</a:t>
+            </a:r>
+            <a:r>
+              <a:rPr lang="en-CH" dirty="0"/>
+              <a:t>o</a:t>
+            </a:r>
+            <a:r>
+              <a:rPr lang="de-CH" dirty="0"/>
+              <a:t>g</a:t>
+            </a:r>
+            <a:r>
+              <a:rPr lang="en-CH" dirty="0"/>
+              <a:t>s&gt;</a:t>
+            </a:r>
+            <a:endParaRPr lang="de-CH" dirty="0"/>
+          </a:p>
+        </p:txBody>
+      </p:sp>
+      <p:sp>
+        <p:nvSpPr>
+          <p:cNvPr id="9" name="Rectangle 8">
+            <a:extLst>
+              <a:ext uri="{FF2B5EF4-FFF2-40B4-BE49-F238E27FC236}">
+                <a16:creationId xmlns:a16="http://schemas.microsoft.com/office/drawing/2014/main" id="{09A4E1D4-A970-4C64-B7A9-A80E5BFA09CD}"/>
+              </a:ext>
+            </a:extLst>
+          </p:cNvPr>
+          <p:cNvSpPr/>
+          <p:nvPr/>
+        </p:nvSpPr>
+        <p:spPr>
+          <a:xfrm>
+            <a:off x="269507" y="967340"/>
+            <a:ext cx="1838425" cy="885524"/>
+          </a:xfrm>
+          <a:prstGeom prst="rect">
+            <a:avLst/>
+          </a:prstGeom>
+        </p:spPr>
+        <p:style>
+          <a:lnRef idx="2">
+            <a:schemeClr val="dk1"/>
+          </a:lnRef>
+          <a:fillRef idx="1">
+            <a:schemeClr val="lt1"/>
+          </a:fillRef>
+          <a:effectRef idx="0">
+            <a:schemeClr val="dk1"/>
+          </a:effectRef>
+          <a:fontRef idx="minor">
+            <a:schemeClr val="dk1"/>
+          </a:fontRef>
+        </p:style>
+        <p:txBody>
+          <a:bodyPr rtlCol="0" anchor="ctr"/>
+          <a:lstStyle/>
+          <a:p>
+            <a:pPr algn="ctr"/>
+            <a:r>
+              <a:rPr lang="de-CH" dirty="0"/>
+              <a:t>A</a:t>
+            </a:r>
+            <a:r>
+              <a:rPr lang="en-CH" dirty="0"/>
+              <a:t>n</a:t>
+            </a:r>
+            <a:r>
+              <a:rPr lang="de-CH" dirty="0"/>
+              <a:t>i</a:t>
+            </a:r>
+            <a:r>
+              <a:rPr lang="en-CH" dirty="0"/>
+              <a:t>m</a:t>
+            </a:r>
+            <a:r>
+              <a:rPr lang="de-CH" dirty="0"/>
+              <a:t>a</a:t>
+            </a:r>
+            <a:r>
+              <a:rPr lang="en-CH" dirty="0"/>
+              <a:t>l</a:t>
+            </a:r>
+            <a:endParaRPr lang="de-CH" dirty="0"/>
+          </a:p>
+        </p:txBody>
+      </p:sp>
+      <p:sp>
+        <p:nvSpPr>
+          <p:cNvPr id="10" name="Rectangle 9">
+            <a:extLst>
+              <a:ext uri="{FF2B5EF4-FFF2-40B4-BE49-F238E27FC236}">
+                <a16:creationId xmlns:a16="http://schemas.microsoft.com/office/drawing/2014/main" id="{77A26038-21C8-4A2D-AEB0-CB9B4DBB15E1}"/>
+              </a:ext>
+            </a:extLst>
+          </p:cNvPr>
+          <p:cNvSpPr/>
+          <p:nvPr/>
+        </p:nvSpPr>
+        <p:spPr>
+          <a:xfrm>
+            <a:off x="269506" y="3102544"/>
+            <a:ext cx="1838425" cy="885524"/>
+          </a:xfrm>
+          <a:prstGeom prst="rect">
+            <a:avLst/>
+          </a:prstGeom>
+        </p:spPr>
+        <p:style>
+          <a:lnRef idx="2">
+            <a:schemeClr val="dk1"/>
+          </a:lnRef>
+          <a:fillRef idx="1">
+            <a:schemeClr val="lt1"/>
+          </a:fillRef>
+          <a:effectRef idx="0">
+            <a:schemeClr val="dk1"/>
+          </a:effectRef>
+          <a:fontRef idx="minor">
+            <a:schemeClr val="dk1"/>
+          </a:fontRef>
+        </p:style>
+        <p:txBody>
+          <a:bodyPr rtlCol="0" anchor="ctr"/>
+          <a:lstStyle/>
+          <a:p>
+            <a:pPr algn="ctr"/>
+            <a:r>
+              <a:rPr lang="de-CH" dirty="0"/>
+              <a:t>D</a:t>
+            </a:r>
+            <a:r>
+              <a:rPr lang="en-CH" dirty="0"/>
+              <a:t>o</a:t>
+            </a:r>
+            <a:r>
+              <a:rPr lang="de-CH" dirty="0"/>
+              <a:t>g</a:t>
+            </a:r>
+          </a:p>
+        </p:txBody>
+      </p:sp>
+      <p:grpSp>
+        <p:nvGrpSpPr>
+          <p:cNvPr id="17" name="Group 16">
+            <a:extLst>
+              <a:ext uri="{FF2B5EF4-FFF2-40B4-BE49-F238E27FC236}">
+                <a16:creationId xmlns:a16="http://schemas.microsoft.com/office/drawing/2014/main" id="{827DC877-DB31-4928-8AAA-E9B62684D43D}"/>
+              </a:ext>
+            </a:extLst>
+          </p:cNvPr>
+          <p:cNvGrpSpPr/>
+          <p:nvPr/>
+        </p:nvGrpSpPr>
+        <p:grpSpPr>
+          <a:xfrm>
+            <a:off x="4255567" y="1848052"/>
+            <a:ext cx="300790" cy="1254492"/>
+            <a:chOff x="3336355" y="1852864"/>
+            <a:chExt cx="300790" cy="1254492"/>
+          </a:xfrm>
+        </p:grpSpPr>
+        <p:sp>
+          <p:nvSpPr>
+            <p:cNvPr id="11" name="Isosceles Triangle 10">
+              <a:extLst>
+                <a:ext uri="{FF2B5EF4-FFF2-40B4-BE49-F238E27FC236}">
+                  <a16:creationId xmlns:a16="http://schemas.microsoft.com/office/drawing/2014/main" id="{61F62F5B-8CAB-4FC6-8B12-35C104957BFC}"/>
+                </a:ext>
+              </a:extLst>
+            </p:cNvPr>
+            <p:cNvSpPr/>
+            <p:nvPr/>
+          </p:nvSpPr>
+          <p:spPr>
+            <a:xfrm>
+              <a:off x="3336355" y="1852864"/>
+              <a:ext cx="300790" cy="348915"/>
+            </a:xfrm>
+            <a:prstGeom prst="triangle">
+              <a:avLst/>
+            </a:prstGeom>
+          </p:spPr>
+          <p:style>
+            <a:lnRef idx="2">
+              <a:schemeClr val="dk1"/>
+            </a:lnRef>
+            <a:fillRef idx="1">
+              <a:schemeClr val="lt1"/>
+            </a:fillRef>
+            <a:effectRef idx="0">
+              <a:schemeClr val="dk1"/>
+            </a:effectRef>
+            <a:fontRef idx="minor">
+              <a:schemeClr val="dk1"/>
+            </a:fontRef>
+          </p:style>
+          <p:txBody>
+            <a:bodyPr rtlCol="0" anchor="ctr"/>
+            <a:lstStyle/>
+            <a:p>
+              <a:pPr algn="ctr"/>
+              <a:endParaRPr lang="de-CH"/>
+            </a:p>
+          </p:txBody>
+        </p:sp>
+        <p:cxnSp>
+          <p:nvCxnSpPr>
+            <p:cNvPr id="13" name="Straight Connector 12">
+              <a:extLst>
+                <a:ext uri="{FF2B5EF4-FFF2-40B4-BE49-F238E27FC236}">
+                  <a16:creationId xmlns:a16="http://schemas.microsoft.com/office/drawing/2014/main" id="{B58440B7-C720-4879-BD1E-CD306BB1E29F}"/>
+                </a:ext>
+              </a:extLst>
+            </p:cNvPr>
+            <p:cNvCxnSpPr>
+              <a:cxnSpLocks/>
+              <a:stCxn id="11" idx="3"/>
+              <a:endCxn id="3" idx="0"/>
+            </p:cNvCxnSpPr>
+            <p:nvPr/>
+          </p:nvCxnSpPr>
+          <p:spPr>
+            <a:xfrm>
+              <a:off x="3486750" y="2201779"/>
+              <a:ext cx="1" cy="905577"/>
+            </a:xfrm>
+            <a:prstGeom prst="line">
+              <a:avLst/>
+            </a:prstGeom>
+          </p:spPr>
+          <p:style>
+            <a:lnRef idx="1">
+              <a:schemeClr val="dk1"/>
+            </a:lnRef>
+            <a:fillRef idx="0">
+              <a:schemeClr val="dk1"/>
+            </a:fillRef>
+            <a:effectRef idx="0">
+              <a:schemeClr val="dk1"/>
+            </a:effectRef>
+            <a:fontRef idx="minor">
+              <a:schemeClr val="tx1"/>
+            </a:fontRef>
+          </p:style>
+        </p:cxnSp>
+      </p:grpSp>
+      <p:grpSp>
+        <p:nvGrpSpPr>
+          <p:cNvPr id="18" name="Group 17">
+            <a:extLst>
+              <a:ext uri="{FF2B5EF4-FFF2-40B4-BE49-F238E27FC236}">
+                <a16:creationId xmlns:a16="http://schemas.microsoft.com/office/drawing/2014/main" id="{C54BF4F1-44CE-4EF2-B4C4-C8760C774C9E}"/>
+              </a:ext>
+            </a:extLst>
+          </p:cNvPr>
+          <p:cNvGrpSpPr/>
+          <p:nvPr/>
+        </p:nvGrpSpPr>
+        <p:grpSpPr>
+          <a:xfrm>
+            <a:off x="1038323" y="1848052"/>
+            <a:ext cx="300790" cy="1254492"/>
+            <a:chOff x="3336355" y="1852864"/>
+            <a:chExt cx="300790" cy="1254492"/>
+          </a:xfrm>
+        </p:grpSpPr>
+        <p:sp>
+          <p:nvSpPr>
+            <p:cNvPr id="19" name="Isosceles Triangle 18">
+              <a:extLst>
+                <a:ext uri="{FF2B5EF4-FFF2-40B4-BE49-F238E27FC236}">
+                  <a16:creationId xmlns:a16="http://schemas.microsoft.com/office/drawing/2014/main" id="{3B89E821-82B4-476D-BA01-5C1B1AEB8987}"/>
+                </a:ext>
+              </a:extLst>
+            </p:cNvPr>
+            <p:cNvSpPr/>
+            <p:nvPr/>
+          </p:nvSpPr>
+          <p:spPr>
+            <a:xfrm>
+              <a:off x="3336355" y="1852864"/>
+              <a:ext cx="300790" cy="348915"/>
+            </a:xfrm>
+            <a:prstGeom prst="triangle">
+              <a:avLst/>
+            </a:prstGeom>
+          </p:spPr>
+          <p:style>
+            <a:lnRef idx="2">
+              <a:schemeClr val="dk1"/>
+            </a:lnRef>
+            <a:fillRef idx="1">
+              <a:schemeClr val="lt1"/>
+            </a:fillRef>
+            <a:effectRef idx="0">
+              <a:schemeClr val="dk1"/>
+            </a:effectRef>
+            <a:fontRef idx="minor">
+              <a:schemeClr val="dk1"/>
+            </a:fontRef>
+          </p:style>
+          <p:txBody>
+            <a:bodyPr rtlCol="0" anchor="ctr"/>
+            <a:lstStyle/>
+            <a:p>
+              <a:pPr algn="ctr"/>
+              <a:endParaRPr lang="de-CH"/>
+            </a:p>
+          </p:txBody>
+        </p:sp>
+        <p:cxnSp>
+          <p:nvCxnSpPr>
+            <p:cNvPr id="20" name="Straight Connector 19">
+              <a:extLst>
+                <a:ext uri="{FF2B5EF4-FFF2-40B4-BE49-F238E27FC236}">
+                  <a16:creationId xmlns:a16="http://schemas.microsoft.com/office/drawing/2014/main" id="{C05B48F8-A178-4E88-B18D-53651B5E1786}"/>
+                </a:ext>
+              </a:extLst>
+            </p:cNvPr>
+            <p:cNvCxnSpPr>
+              <a:cxnSpLocks/>
+              <a:stCxn id="19" idx="3"/>
+            </p:cNvCxnSpPr>
+            <p:nvPr/>
+          </p:nvCxnSpPr>
+          <p:spPr>
+            <a:xfrm>
+              <a:off x="3486750" y="2201779"/>
+              <a:ext cx="1" cy="905577"/>
+            </a:xfrm>
+            <a:prstGeom prst="line">
+              <a:avLst/>
+            </a:prstGeom>
+          </p:spPr>
+          <p:style>
+            <a:lnRef idx="1">
+              <a:schemeClr val="dk1"/>
+            </a:lnRef>
+            <a:fillRef idx="0">
+              <a:schemeClr val="dk1"/>
+            </a:fillRef>
+            <a:effectRef idx="0">
+              <a:schemeClr val="dk1"/>
+            </a:effectRef>
+            <a:fontRef idx="minor">
+              <a:schemeClr val="tx1"/>
+            </a:fontRef>
+          </p:style>
+        </p:cxnSp>
+      </p:grpSp>
+      <p:sp>
+        <p:nvSpPr>
+          <p:cNvPr id="58" name="Arrow: Right 57">
+            <a:extLst>
+              <a:ext uri="{FF2B5EF4-FFF2-40B4-BE49-F238E27FC236}">
+                <a16:creationId xmlns:a16="http://schemas.microsoft.com/office/drawing/2014/main" id="{3AF934E6-57E5-43EA-98EB-40DB472AD83A}"/>
+              </a:ext>
+            </a:extLst>
+          </p:cNvPr>
+          <p:cNvSpPr/>
+          <p:nvPr/>
+        </p:nvSpPr>
+        <p:spPr>
+          <a:xfrm>
+            <a:off x="2316480" y="2202181"/>
+            <a:ext cx="1355959" cy="443483"/>
+          </a:xfrm>
+          <a:prstGeom prst="rightArrow">
+            <a:avLst/>
+          </a:prstGeom>
+        </p:spPr>
+        <p:style>
+          <a:lnRef idx="2">
+            <a:schemeClr val="dk1"/>
+          </a:lnRef>
+          <a:fillRef idx="1">
+            <a:schemeClr val="lt1"/>
+          </a:fillRef>
+          <a:effectRef idx="0">
+            <a:schemeClr val="dk1"/>
+          </a:effectRef>
+          <a:fontRef idx="minor">
+            <a:schemeClr val="dk1"/>
+          </a:fontRef>
+        </p:style>
+        <p:txBody>
+          <a:bodyPr rtlCol="0" anchor="ctr"/>
+          <a:lstStyle/>
+          <a:p>
+            <a:pPr algn="ctr"/>
+            <a:endParaRPr lang="de-CH"/>
+          </a:p>
+        </p:txBody>
+      </p:sp>
+      <p:sp>
+        <p:nvSpPr>
+          <p:cNvPr id="59" name="Rectangle 58">
+            <a:extLst>
+              <a:ext uri="{FF2B5EF4-FFF2-40B4-BE49-F238E27FC236}">
+                <a16:creationId xmlns:a16="http://schemas.microsoft.com/office/drawing/2014/main" id="{C9F9A2AE-6C9C-45C0-B9D3-690AEE1CC42C}"/>
+              </a:ext>
+            </a:extLst>
+          </p:cNvPr>
+          <p:cNvSpPr/>
+          <p:nvPr/>
+        </p:nvSpPr>
+        <p:spPr>
+          <a:xfrm>
+            <a:off x="9921239" y="967340"/>
+            <a:ext cx="2228088" cy="885524"/>
+          </a:xfrm>
+          <a:prstGeom prst="rect">
+            <a:avLst/>
+          </a:prstGeom>
+        </p:spPr>
+        <p:style>
+          <a:lnRef idx="2">
+            <a:schemeClr val="dk1"/>
+          </a:lnRef>
+          <a:fillRef idx="1">
+            <a:schemeClr val="lt1"/>
+          </a:fillRef>
+          <a:effectRef idx="0">
+            <a:schemeClr val="dk1"/>
+          </a:effectRef>
+          <a:fontRef idx="minor">
+            <a:schemeClr val="dk1"/>
+          </a:fontRef>
+        </p:style>
+        <p:txBody>
+          <a:bodyPr rtlCol="0" anchor="ctr"/>
+          <a:lstStyle/>
+          <a:p>
+            <a:pPr algn="ctr"/>
+            <a:r>
+              <a:rPr lang="en-CH" dirty="0"/>
+              <a:t>Comparable&lt;Animal&gt;</a:t>
+            </a:r>
+            <a:endParaRPr lang="de-CH" dirty="0"/>
+          </a:p>
+        </p:txBody>
+      </p:sp>
+      <p:sp>
+        <p:nvSpPr>
+          <p:cNvPr id="60" name="Rectangle 59">
+            <a:extLst>
+              <a:ext uri="{FF2B5EF4-FFF2-40B4-BE49-F238E27FC236}">
+                <a16:creationId xmlns:a16="http://schemas.microsoft.com/office/drawing/2014/main" id="{1CFB90F8-DF8C-4671-B272-4D3C3F8DE219}"/>
+              </a:ext>
+            </a:extLst>
+          </p:cNvPr>
+          <p:cNvSpPr/>
+          <p:nvPr/>
+        </p:nvSpPr>
+        <p:spPr>
+          <a:xfrm>
+            <a:off x="9921238" y="3102544"/>
+            <a:ext cx="2228088" cy="885524"/>
+          </a:xfrm>
+          <a:prstGeom prst="rect">
+            <a:avLst/>
+          </a:prstGeom>
+        </p:spPr>
+        <p:style>
+          <a:lnRef idx="2">
+            <a:schemeClr val="dk1"/>
+          </a:lnRef>
+          <a:fillRef idx="1">
+            <a:schemeClr val="lt1"/>
+          </a:fillRef>
+          <a:effectRef idx="0">
+            <a:schemeClr val="dk1"/>
+          </a:effectRef>
+          <a:fontRef idx="minor">
+            <a:schemeClr val="dk1"/>
+          </a:fontRef>
+        </p:style>
+        <p:txBody>
+          <a:bodyPr rtlCol="0" anchor="ctr"/>
+          <a:lstStyle/>
+          <a:p>
+            <a:pPr algn="ctr"/>
+            <a:r>
+              <a:rPr lang="de-CH" dirty="0"/>
+              <a:t>C</a:t>
+            </a:r>
+            <a:r>
+              <a:rPr lang="en-CH" dirty="0"/>
+              <a:t>o</a:t>
+            </a:r>
+            <a:r>
+              <a:rPr lang="de-CH" dirty="0"/>
+              <a:t>m</a:t>
+            </a:r>
+            <a:r>
+              <a:rPr lang="en-CH" dirty="0"/>
+              <a:t>p</a:t>
+            </a:r>
+            <a:r>
+              <a:rPr lang="de-CH" dirty="0"/>
+              <a:t>a</a:t>
+            </a:r>
+            <a:r>
+              <a:rPr lang="en-CH" dirty="0"/>
+              <a:t>r</a:t>
+            </a:r>
+            <a:r>
+              <a:rPr lang="de-CH" dirty="0"/>
+              <a:t>a</a:t>
+            </a:r>
+            <a:r>
+              <a:rPr lang="en-CH" dirty="0"/>
+              <a:t>b</a:t>
+            </a:r>
+            <a:r>
+              <a:rPr lang="de-CH" dirty="0"/>
+              <a:t>l</a:t>
+            </a:r>
+            <a:r>
+              <a:rPr lang="en-CH" dirty="0"/>
+              <a:t>e&lt;</a:t>
+            </a:r>
+            <a:r>
+              <a:rPr lang="de-CH" dirty="0"/>
+              <a:t>D</a:t>
+            </a:r>
+            <a:r>
+              <a:rPr lang="en-CH" dirty="0"/>
+              <a:t>o</a:t>
+            </a:r>
+            <a:r>
+              <a:rPr lang="de-CH" dirty="0"/>
+              <a:t>g</a:t>
+            </a:r>
+            <a:r>
+              <a:rPr lang="en-CH" dirty="0"/>
+              <a:t>s&gt;</a:t>
+            </a:r>
+            <a:endParaRPr lang="de-CH" dirty="0"/>
+          </a:p>
+        </p:txBody>
+      </p:sp>
+      <p:sp>
+        <p:nvSpPr>
+          <p:cNvPr id="61" name="Rectangle 60">
+            <a:extLst>
+              <a:ext uri="{FF2B5EF4-FFF2-40B4-BE49-F238E27FC236}">
+                <a16:creationId xmlns:a16="http://schemas.microsoft.com/office/drawing/2014/main" id="{DD1448CA-7710-4ED0-9FB6-D3FB63CE93FC}"/>
+              </a:ext>
+            </a:extLst>
+          </p:cNvPr>
+          <p:cNvSpPr/>
+          <p:nvPr/>
+        </p:nvSpPr>
+        <p:spPr>
+          <a:xfrm>
+            <a:off x="6703995" y="967340"/>
+            <a:ext cx="1838425" cy="885524"/>
+          </a:xfrm>
+          <a:prstGeom prst="rect">
+            <a:avLst/>
+          </a:prstGeom>
+        </p:spPr>
+        <p:style>
+          <a:lnRef idx="2">
+            <a:schemeClr val="dk1"/>
+          </a:lnRef>
+          <a:fillRef idx="1">
+            <a:schemeClr val="lt1"/>
+          </a:fillRef>
+          <a:effectRef idx="0">
+            <a:schemeClr val="dk1"/>
+          </a:effectRef>
+          <a:fontRef idx="minor">
+            <a:schemeClr val="dk1"/>
+          </a:fontRef>
+        </p:style>
+        <p:txBody>
+          <a:bodyPr rtlCol="0" anchor="ctr"/>
+          <a:lstStyle/>
+          <a:p>
+            <a:pPr algn="ctr"/>
+            <a:r>
+              <a:rPr lang="de-CH" dirty="0"/>
+              <a:t>A</a:t>
+            </a:r>
+            <a:r>
+              <a:rPr lang="en-CH" dirty="0"/>
+              <a:t>n</a:t>
+            </a:r>
+            <a:r>
+              <a:rPr lang="de-CH" dirty="0"/>
+              <a:t>i</a:t>
+            </a:r>
+            <a:r>
+              <a:rPr lang="en-CH" dirty="0"/>
+              <a:t>m</a:t>
+            </a:r>
+            <a:r>
+              <a:rPr lang="de-CH" dirty="0"/>
+              <a:t>a</a:t>
+            </a:r>
+            <a:r>
+              <a:rPr lang="en-CH" dirty="0"/>
+              <a:t>l</a:t>
+            </a:r>
+            <a:endParaRPr lang="de-CH" dirty="0"/>
+          </a:p>
+        </p:txBody>
+      </p:sp>
+      <p:sp>
+        <p:nvSpPr>
+          <p:cNvPr id="62" name="Rectangle 61">
+            <a:extLst>
+              <a:ext uri="{FF2B5EF4-FFF2-40B4-BE49-F238E27FC236}">
+                <a16:creationId xmlns:a16="http://schemas.microsoft.com/office/drawing/2014/main" id="{34B1C234-9F82-4E10-8293-EDB4E4315973}"/>
+              </a:ext>
+            </a:extLst>
+          </p:cNvPr>
+          <p:cNvSpPr/>
+          <p:nvPr/>
+        </p:nvSpPr>
+        <p:spPr>
+          <a:xfrm>
+            <a:off x="6703994" y="3102544"/>
+            <a:ext cx="1838425" cy="885524"/>
+          </a:xfrm>
+          <a:prstGeom prst="rect">
+            <a:avLst/>
+          </a:prstGeom>
+        </p:spPr>
+        <p:style>
+          <a:lnRef idx="2">
+            <a:schemeClr val="dk1"/>
+          </a:lnRef>
+          <a:fillRef idx="1">
+            <a:schemeClr val="lt1"/>
+          </a:fillRef>
+          <a:effectRef idx="0">
+            <a:schemeClr val="dk1"/>
+          </a:effectRef>
+          <a:fontRef idx="minor">
+            <a:schemeClr val="dk1"/>
+          </a:fontRef>
+        </p:style>
+        <p:txBody>
+          <a:bodyPr rtlCol="0" anchor="ctr"/>
+          <a:lstStyle/>
+          <a:p>
+            <a:pPr algn="ctr"/>
+            <a:r>
+              <a:rPr lang="de-CH" dirty="0"/>
+              <a:t>D</a:t>
+            </a:r>
+            <a:r>
+              <a:rPr lang="en-CH" dirty="0"/>
+              <a:t>o</a:t>
+            </a:r>
+            <a:r>
+              <a:rPr lang="de-CH" dirty="0"/>
+              <a:t>g</a:t>
+            </a:r>
+          </a:p>
+        </p:txBody>
+      </p:sp>
+      <p:grpSp>
+        <p:nvGrpSpPr>
+          <p:cNvPr id="66" name="Group 65">
+            <a:extLst>
+              <a:ext uri="{FF2B5EF4-FFF2-40B4-BE49-F238E27FC236}">
+                <a16:creationId xmlns:a16="http://schemas.microsoft.com/office/drawing/2014/main" id="{B55A0849-2ED9-4860-9B78-6F4F332D0800}"/>
+              </a:ext>
+            </a:extLst>
+          </p:cNvPr>
+          <p:cNvGrpSpPr/>
+          <p:nvPr/>
+        </p:nvGrpSpPr>
+        <p:grpSpPr>
+          <a:xfrm>
+            <a:off x="7472811" y="1848052"/>
+            <a:ext cx="300790" cy="1254492"/>
+            <a:chOff x="3336355" y="1852864"/>
+            <a:chExt cx="300790" cy="1254492"/>
+          </a:xfrm>
+        </p:grpSpPr>
+        <p:sp>
+          <p:nvSpPr>
+            <p:cNvPr id="67" name="Isosceles Triangle 66">
+              <a:extLst>
+                <a:ext uri="{FF2B5EF4-FFF2-40B4-BE49-F238E27FC236}">
+                  <a16:creationId xmlns:a16="http://schemas.microsoft.com/office/drawing/2014/main" id="{981E3307-2BFC-421F-8753-6AA6AA1ED450}"/>
+                </a:ext>
+              </a:extLst>
+            </p:cNvPr>
+            <p:cNvSpPr/>
+            <p:nvPr/>
+          </p:nvSpPr>
+          <p:spPr>
+            <a:xfrm>
+              <a:off x="3336355" y="1852864"/>
+              <a:ext cx="300790" cy="348915"/>
+            </a:xfrm>
+            <a:prstGeom prst="triangle">
+              <a:avLst/>
+            </a:prstGeom>
+          </p:spPr>
+          <p:style>
+            <a:lnRef idx="2">
+              <a:schemeClr val="dk1"/>
+            </a:lnRef>
+            <a:fillRef idx="1">
+              <a:schemeClr val="lt1"/>
+            </a:fillRef>
+            <a:effectRef idx="0">
+              <a:schemeClr val="dk1"/>
+            </a:effectRef>
+            <a:fontRef idx="minor">
+              <a:schemeClr val="dk1"/>
+            </a:fontRef>
+          </p:style>
+          <p:txBody>
+            <a:bodyPr rtlCol="0" anchor="ctr"/>
+            <a:lstStyle/>
+            <a:p>
+              <a:pPr algn="ctr"/>
+              <a:endParaRPr lang="de-CH"/>
+            </a:p>
+          </p:txBody>
+        </p:sp>
+        <p:cxnSp>
+          <p:nvCxnSpPr>
+            <p:cNvPr id="68" name="Straight Connector 67">
+              <a:extLst>
+                <a:ext uri="{FF2B5EF4-FFF2-40B4-BE49-F238E27FC236}">
+                  <a16:creationId xmlns:a16="http://schemas.microsoft.com/office/drawing/2014/main" id="{0D496F9A-1FE1-43F2-BF3F-D926074496F3}"/>
+                </a:ext>
+              </a:extLst>
+            </p:cNvPr>
+            <p:cNvCxnSpPr>
+              <a:cxnSpLocks/>
+              <a:stCxn id="67" idx="3"/>
+            </p:cNvCxnSpPr>
+            <p:nvPr/>
+          </p:nvCxnSpPr>
+          <p:spPr>
+            <a:xfrm>
+              <a:off x="3486750" y="2201779"/>
+              <a:ext cx="1" cy="905577"/>
+            </a:xfrm>
+            <a:prstGeom prst="line">
+              <a:avLst/>
+            </a:prstGeom>
+          </p:spPr>
+          <p:style>
+            <a:lnRef idx="1">
+              <a:schemeClr val="dk1"/>
+            </a:lnRef>
+            <a:fillRef idx="0">
+              <a:schemeClr val="dk1"/>
+            </a:fillRef>
+            <a:effectRef idx="0">
+              <a:schemeClr val="dk1"/>
+            </a:effectRef>
+            <a:fontRef idx="minor">
+              <a:schemeClr val="tx1"/>
+            </a:fontRef>
+          </p:style>
+        </p:cxnSp>
+      </p:grpSp>
+      <p:sp>
+        <p:nvSpPr>
+          <p:cNvPr id="69" name="Arrow: Right 68">
+            <a:extLst>
+              <a:ext uri="{FF2B5EF4-FFF2-40B4-BE49-F238E27FC236}">
+                <a16:creationId xmlns:a16="http://schemas.microsoft.com/office/drawing/2014/main" id="{13D516E7-4403-4CDD-8931-7819C5ECED4D}"/>
+              </a:ext>
+            </a:extLst>
+          </p:cNvPr>
+          <p:cNvSpPr/>
+          <p:nvPr/>
+        </p:nvSpPr>
+        <p:spPr>
+          <a:xfrm>
+            <a:off x="8750968" y="2202181"/>
+            <a:ext cx="1355959" cy="443483"/>
+          </a:xfrm>
+          <a:prstGeom prst="rightArrow">
+            <a:avLst/>
+          </a:prstGeom>
+        </p:spPr>
+        <p:style>
+          <a:lnRef idx="2">
+            <a:schemeClr val="dk1"/>
+          </a:lnRef>
+          <a:fillRef idx="1">
+            <a:schemeClr val="lt1"/>
+          </a:fillRef>
+          <a:effectRef idx="0">
+            <a:schemeClr val="dk1"/>
+          </a:effectRef>
+          <a:fontRef idx="minor">
+            <a:schemeClr val="dk1"/>
+          </a:fontRef>
+        </p:style>
+        <p:txBody>
+          <a:bodyPr rtlCol="0" anchor="ctr"/>
+          <a:lstStyle/>
+          <a:p>
+            <a:pPr algn="ctr"/>
+            <a:endParaRPr lang="de-CH"/>
+          </a:p>
+        </p:txBody>
+      </p:sp>
+      <p:grpSp>
+        <p:nvGrpSpPr>
+          <p:cNvPr id="71" name="Group 70">
+            <a:extLst>
+              <a:ext uri="{FF2B5EF4-FFF2-40B4-BE49-F238E27FC236}">
+                <a16:creationId xmlns:a16="http://schemas.microsoft.com/office/drawing/2014/main" id="{EADB3BA9-2300-4CE7-80A6-48B2696404CA}"/>
+              </a:ext>
+            </a:extLst>
+          </p:cNvPr>
+          <p:cNvGrpSpPr/>
+          <p:nvPr/>
+        </p:nvGrpSpPr>
+        <p:grpSpPr>
+          <a:xfrm>
+            <a:off x="10863875" y="1856555"/>
+            <a:ext cx="300790" cy="1254492"/>
+            <a:chOff x="3336355" y="1852864"/>
+            <a:chExt cx="300790" cy="1254492"/>
+          </a:xfrm>
+        </p:grpSpPr>
+        <p:sp>
+          <p:nvSpPr>
+            <p:cNvPr id="72" name="Isosceles Triangle 71">
+              <a:extLst>
+                <a:ext uri="{FF2B5EF4-FFF2-40B4-BE49-F238E27FC236}">
+                  <a16:creationId xmlns:a16="http://schemas.microsoft.com/office/drawing/2014/main" id="{A6EB7B7A-A59E-4E6D-A3C5-DC743752A43E}"/>
+                </a:ext>
+              </a:extLst>
+            </p:cNvPr>
+            <p:cNvSpPr/>
+            <p:nvPr/>
+          </p:nvSpPr>
+          <p:spPr>
+            <a:xfrm>
+              <a:off x="3336355" y="1852864"/>
+              <a:ext cx="300790" cy="348915"/>
+            </a:xfrm>
+            <a:prstGeom prst="triangle">
+              <a:avLst/>
+            </a:prstGeom>
+          </p:spPr>
+          <p:style>
+            <a:lnRef idx="2">
+              <a:schemeClr val="dk1"/>
+            </a:lnRef>
+            <a:fillRef idx="1">
+              <a:schemeClr val="lt1"/>
+            </a:fillRef>
+            <a:effectRef idx="0">
+              <a:schemeClr val="dk1"/>
+            </a:effectRef>
+            <a:fontRef idx="minor">
+              <a:schemeClr val="dk1"/>
+            </a:fontRef>
+          </p:style>
+          <p:txBody>
+            <a:bodyPr rtlCol="0" anchor="ctr"/>
+            <a:lstStyle/>
+            <a:p>
+              <a:pPr algn="ctr"/>
+              <a:endParaRPr lang="de-CH"/>
+            </a:p>
+          </p:txBody>
+        </p:sp>
+        <p:cxnSp>
+          <p:nvCxnSpPr>
+            <p:cNvPr id="73" name="Straight Connector 72">
+              <a:extLst>
+                <a:ext uri="{FF2B5EF4-FFF2-40B4-BE49-F238E27FC236}">
+                  <a16:creationId xmlns:a16="http://schemas.microsoft.com/office/drawing/2014/main" id="{BD2061B2-4386-4CAA-A58C-D003FD8AB5F6}"/>
+                </a:ext>
+              </a:extLst>
+            </p:cNvPr>
+            <p:cNvCxnSpPr>
+              <a:cxnSpLocks/>
+              <a:stCxn id="72" idx="3"/>
+            </p:cNvCxnSpPr>
+            <p:nvPr/>
+          </p:nvCxnSpPr>
+          <p:spPr>
+            <a:xfrm>
+              <a:off x="3486750" y="2201779"/>
+              <a:ext cx="1" cy="905577"/>
+            </a:xfrm>
+            <a:prstGeom prst="line">
+              <a:avLst/>
+            </a:prstGeom>
+          </p:spPr>
+          <p:style>
+            <a:lnRef idx="1">
+              <a:schemeClr val="dk1"/>
+            </a:lnRef>
+            <a:fillRef idx="0">
+              <a:schemeClr val="dk1"/>
+            </a:fillRef>
+            <a:effectRef idx="0">
+              <a:schemeClr val="dk1"/>
+            </a:effectRef>
+            <a:fontRef idx="minor">
+              <a:schemeClr val="tx1"/>
+            </a:fontRef>
+          </p:style>
+        </p:cxnSp>
+      </p:grpSp>
+      <p:cxnSp>
+        <p:nvCxnSpPr>
+          <p:cNvPr id="75" name="Straight Connector 74">
+            <a:extLst>
+              <a:ext uri="{FF2B5EF4-FFF2-40B4-BE49-F238E27FC236}">
+                <a16:creationId xmlns:a16="http://schemas.microsoft.com/office/drawing/2014/main" id="{EDB14146-DE8B-47E7-AC01-D6A7A82BD53A}"/>
+              </a:ext>
+            </a:extLst>
+          </p:cNvPr>
+          <p:cNvCxnSpPr/>
+          <p:nvPr/>
+        </p:nvCxnSpPr>
+        <p:spPr>
+          <a:xfrm flipH="1">
+            <a:off x="9150096" y="2066544"/>
+            <a:ext cx="487680" cy="694944"/>
+          </a:xfrm>
+          <a:prstGeom prst="line">
+            <a:avLst/>
+          </a:prstGeom>
+          <a:ln w="76200"/>
+        </p:spPr>
+        <p:style>
+          <a:lnRef idx="1">
+            <a:schemeClr val="dk1"/>
+          </a:lnRef>
+          <a:fillRef idx="0">
+            <a:schemeClr val="dk1"/>
+          </a:fillRef>
+          <a:effectRef idx="0">
+            <a:schemeClr val="dk1"/>
+          </a:effectRef>
+          <a:fontRef idx="minor">
+            <a:schemeClr val="tx1"/>
+          </a:fontRef>
+        </p:style>
+      </p:cxnSp>
+      <p:sp>
+        <p:nvSpPr>
+          <p:cNvPr id="76" name="TextBox 75">
+            <a:extLst>
+              <a:ext uri="{FF2B5EF4-FFF2-40B4-BE49-F238E27FC236}">
+                <a16:creationId xmlns:a16="http://schemas.microsoft.com/office/drawing/2014/main" id="{420EE907-4041-4527-8A15-371FE393E9B3}"/>
+              </a:ext>
+            </a:extLst>
+          </p:cNvPr>
+          <p:cNvSpPr txBox="1"/>
+          <p:nvPr/>
+        </p:nvSpPr>
+        <p:spPr>
+          <a:xfrm>
+            <a:off x="1339113" y="4309872"/>
+            <a:ext cx="3171927" cy="369332"/>
+          </a:xfrm>
+          <a:prstGeom prst="rect">
+            <a:avLst/>
+          </a:prstGeom>
+          <a:noFill/>
+        </p:spPr>
+        <p:txBody>
+          <a:bodyPr wrap="square" rtlCol="0">
+            <a:spAutoFit/>
+          </a:bodyPr>
+          <a:lstStyle/>
+          <a:p>
+            <a:r>
+              <a:rPr lang="de-CH" dirty="0"/>
+              <a:t>D</a:t>
+            </a:r>
+            <a:r>
+              <a:rPr lang="en-CH" dirty="0" err="1"/>
+              <a:t>i</a:t>
+            </a:r>
+            <a:r>
+              <a:rPr lang="de-CH" dirty="0"/>
+              <a:t>e</a:t>
+            </a:r>
+            <a:r>
+              <a:rPr lang="en-CH" dirty="0"/>
+              <a:t> </a:t>
+            </a:r>
+            <a:r>
+              <a:rPr lang="de-CH" dirty="0"/>
+              <a:t>K</a:t>
+            </a:r>
+            <a:r>
+              <a:rPr lang="en-CH" dirty="0"/>
+              <a:t>l</a:t>
+            </a:r>
+            <a:r>
+              <a:rPr lang="de-CH" dirty="0"/>
+              <a:t>a</a:t>
+            </a:r>
+            <a:r>
+              <a:rPr lang="en-CH" dirty="0"/>
+              <a:t>s</a:t>
+            </a:r>
+            <a:r>
+              <a:rPr lang="de-CH" dirty="0"/>
+              <a:t>s</a:t>
+            </a:r>
+            <a:r>
+              <a:rPr lang="en-CH" dirty="0"/>
+              <a:t>e </a:t>
+            </a:r>
+            <a:r>
+              <a:rPr lang="de-CH" dirty="0"/>
+              <a:t>L</a:t>
+            </a:r>
+            <a:r>
+              <a:rPr lang="en-CH" dirty="0" err="1"/>
+              <a:t>i</a:t>
+            </a:r>
+            <a:r>
+              <a:rPr lang="de-CH" dirty="0"/>
+              <a:t>s</a:t>
+            </a:r>
+            <a:r>
+              <a:rPr lang="en-CH" dirty="0"/>
+              <a:t>t&lt;T&gt; </a:t>
+            </a:r>
+            <a:r>
+              <a:rPr lang="de-CH" dirty="0"/>
+              <a:t>i</a:t>
+            </a:r>
+            <a:r>
+              <a:rPr lang="en-CH" dirty="0"/>
+              <a:t>s</a:t>
+            </a:r>
+            <a:r>
+              <a:rPr lang="de-CH" dirty="0"/>
+              <a:t>t</a:t>
+            </a:r>
+            <a:r>
+              <a:rPr lang="en-CH" dirty="0"/>
+              <a:t> </a:t>
+            </a:r>
+            <a:r>
+              <a:rPr lang="de-CH" dirty="0"/>
+              <a:t>k</a:t>
+            </a:r>
+            <a:r>
+              <a:rPr lang="en-CH" dirty="0"/>
+              <a:t>o</a:t>
+            </a:r>
+            <a:r>
+              <a:rPr lang="de-CH" dirty="0"/>
+              <a:t>v</a:t>
+            </a:r>
+            <a:r>
+              <a:rPr lang="en-CH" dirty="0"/>
+              <a:t>a</a:t>
+            </a:r>
+            <a:r>
+              <a:rPr lang="de-CH" dirty="0"/>
+              <a:t>r</a:t>
+            </a:r>
+            <a:r>
+              <a:rPr lang="en-CH" dirty="0" err="1"/>
+              <a:t>i</a:t>
+            </a:r>
+            <a:r>
+              <a:rPr lang="de-CH" dirty="0"/>
+              <a:t>a</a:t>
+            </a:r>
+            <a:r>
+              <a:rPr lang="en-CH" dirty="0"/>
+              <a:t>n</a:t>
+            </a:r>
+            <a:r>
+              <a:rPr lang="de-CH" dirty="0"/>
+              <a:t>t</a:t>
+            </a:r>
+          </a:p>
+        </p:txBody>
+      </p:sp>
+      <p:sp>
+        <p:nvSpPr>
+          <p:cNvPr id="80" name="TextBox 79">
+            <a:extLst>
+              <a:ext uri="{FF2B5EF4-FFF2-40B4-BE49-F238E27FC236}">
+                <a16:creationId xmlns:a16="http://schemas.microsoft.com/office/drawing/2014/main" id="{1A60A045-A664-4C83-9247-4E3A7CFAF9C6}"/>
+              </a:ext>
+            </a:extLst>
+          </p:cNvPr>
+          <p:cNvSpPr txBox="1"/>
+          <p:nvPr/>
+        </p:nvSpPr>
+        <p:spPr>
+          <a:xfrm>
+            <a:off x="7680963" y="4309872"/>
+            <a:ext cx="3950206" cy="369332"/>
+          </a:xfrm>
+          <a:prstGeom prst="rect">
+            <a:avLst/>
+          </a:prstGeom>
+          <a:noFill/>
+        </p:spPr>
+        <p:txBody>
+          <a:bodyPr wrap="square" rtlCol="0">
+            <a:spAutoFit/>
+          </a:bodyPr>
+          <a:lstStyle/>
+          <a:p>
+            <a:r>
+              <a:rPr lang="de-CH" dirty="0"/>
+              <a:t>D</a:t>
+            </a:r>
+            <a:r>
+              <a:rPr lang="en-CH" dirty="0" err="1"/>
+              <a:t>i</a:t>
+            </a:r>
+            <a:r>
+              <a:rPr lang="de-CH" dirty="0"/>
+              <a:t>e</a:t>
+            </a:r>
+            <a:r>
+              <a:rPr lang="en-CH" dirty="0"/>
+              <a:t> </a:t>
+            </a:r>
+            <a:r>
+              <a:rPr lang="de-CH" dirty="0"/>
+              <a:t>K</a:t>
+            </a:r>
+            <a:r>
+              <a:rPr lang="en-CH" dirty="0"/>
+              <a:t>l</a:t>
+            </a:r>
+            <a:r>
+              <a:rPr lang="de-CH" dirty="0"/>
+              <a:t>a</a:t>
+            </a:r>
+            <a:r>
+              <a:rPr lang="en-CH" dirty="0"/>
+              <a:t>s</a:t>
+            </a:r>
+            <a:r>
+              <a:rPr lang="de-CH" dirty="0"/>
+              <a:t>s</a:t>
+            </a:r>
+            <a:r>
+              <a:rPr lang="en-CH" dirty="0"/>
+              <a:t>e Comparable&lt;</a:t>
+            </a:r>
+            <a:r>
+              <a:rPr lang="de-CH" dirty="0"/>
+              <a:t>T</a:t>
+            </a:r>
+            <a:r>
+              <a:rPr lang="en-CH" dirty="0"/>
+              <a:t>&gt; </a:t>
+            </a:r>
+            <a:r>
+              <a:rPr lang="de-CH" dirty="0"/>
+              <a:t>i</a:t>
+            </a:r>
+            <a:r>
+              <a:rPr lang="en-CH" dirty="0"/>
+              <a:t>s</a:t>
+            </a:r>
+            <a:r>
+              <a:rPr lang="de-CH" dirty="0"/>
+              <a:t>t</a:t>
+            </a:r>
+            <a:r>
+              <a:rPr lang="en-CH" dirty="0"/>
+              <a:t> </a:t>
+            </a:r>
+            <a:r>
+              <a:rPr lang="de-CH" dirty="0"/>
+              <a:t>i</a:t>
+            </a:r>
+            <a:r>
+              <a:rPr lang="en-CH" dirty="0"/>
+              <a:t>n</a:t>
+            </a:r>
+            <a:r>
+              <a:rPr lang="de-CH" dirty="0"/>
+              <a:t>v</a:t>
+            </a:r>
+            <a:r>
+              <a:rPr lang="en-CH" dirty="0"/>
+              <a:t>a</a:t>
+            </a:r>
+            <a:r>
+              <a:rPr lang="de-CH" dirty="0"/>
+              <a:t>r</a:t>
+            </a:r>
+            <a:r>
+              <a:rPr lang="en-CH" dirty="0" err="1"/>
+              <a:t>i</a:t>
+            </a:r>
+            <a:r>
+              <a:rPr lang="de-CH" dirty="0"/>
+              <a:t>a</a:t>
+            </a:r>
+            <a:r>
+              <a:rPr lang="en-CH" dirty="0"/>
+              <a:t>n</a:t>
+            </a:r>
+            <a:r>
+              <a:rPr lang="de-CH" dirty="0"/>
+              <a:t>t</a:t>
+            </a:r>
+          </a:p>
+        </p:txBody>
+      </p:sp>
+    </p:spTree>
+    <p:extLst>
+      <p:ext uri="{BB962C8B-B14F-4D97-AF65-F5344CB8AC3E}">
+        <p14:creationId xmlns:p14="http://schemas.microsoft.com/office/powerpoint/2010/main" val="3320918645"/>
+      </p:ext>
+    </p:extLst>
+  </p:cSld>
+  <p:clrMapOvr>
+    <a:masterClrMapping/>
+  </p:clrMapOvr>
+</p:sld>
+</file>
+
+<file path=ppt/slides/slide4.xml><?xml version="1.0" encoding="utf-8"?>
+<p:sld xmlns:a="http://schemas.openxmlformats.org/drawingml/2006/main" xmlns:r="http://schemas.openxmlformats.org/officeDocument/2006/relationships" xmlns:p="http://schemas.openxmlformats.org/presentationml/2006/main">
+  <p:cSld>
+    <p:spTree>
+      <p:nvGrpSpPr>
+        <p:cNvPr id="1" name=""/>
+        <p:cNvGrpSpPr/>
+        <p:nvPr/>
+      </p:nvGrpSpPr>
+      <p:grpSpPr>
+        <a:xfrm>
+          <a:off x="0" y="0"/>
+          <a:ext cx="0" cy="0"/>
+          <a:chOff x="0" y="0"/>
+          <a:chExt cx="0" cy="0"/>
+        </a:xfrm>
+      </p:grpSpPr>
+      <p:sp>
+        <p:nvSpPr>
+          <p:cNvPr id="2" name="Rectangle 1">
+            <a:extLst>
+              <a:ext uri="{FF2B5EF4-FFF2-40B4-BE49-F238E27FC236}">
+                <a16:creationId xmlns:a16="http://schemas.microsoft.com/office/drawing/2014/main" id="{940BA0CE-14A0-455C-A210-2F6FB239DEF0}"/>
+              </a:ext>
+            </a:extLst>
+          </p:cNvPr>
+          <p:cNvSpPr/>
+          <p:nvPr/>
+        </p:nvSpPr>
+        <p:spPr>
+          <a:xfrm>
+            <a:off x="5592917" y="2269814"/>
+            <a:ext cx="1838425" cy="885524"/>
+          </a:xfrm>
+          <a:prstGeom prst="rect">
+            <a:avLst/>
+          </a:prstGeom>
+        </p:spPr>
+        <p:style>
+          <a:lnRef idx="2">
+            <a:schemeClr val="dk1"/>
+          </a:lnRef>
+          <a:fillRef idx="1">
+            <a:schemeClr val="lt1"/>
+          </a:fillRef>
+          <a:effectRef idx="0">
+            <a:schemeClr val="dk1"/>
+          </a:effectRef>
+          <a:fontRef idx="minor">
+            <a:schemeClr val="dk1"/>
+          </a:fontRef>
+        </p:style>
+        <p:txBody>
+          <a:bodyPr rtlCol="0" anchor="ctr"/>
+          <a:lstStyle/>
+          <a:p>
+            <a:pPr algn="ctr"/>
+            <a:r>
+              <a:rPr lang="en-CH" dirty="0"/>
+              <a:t>L</a:t>
+            </a:r>
+            <a:r>
+              <a:rPr lang="de-CH" dirty="0"/>
+              <a:t>i</a:t>
+            </a:r>
+            <a:r>
+              <a:rPr lang="en-CH" dirty="0"/>
+              <a:t>s</a:t>
+            </a:r>
+            <a:r>
+              <a:rPr lang="de-CH" dirty="0"/>
+              <a:t>t</a:t>
+            </a:r>
+            <a:r>
+              <a:rPr lang="en-CH" dirty="0"/>
+              <a:t>&lt;Animal&gt;</a:t>
+            </a:r>
+            <a:endParaRPr lang="de-CH" dirty="0"/>
+          </a:p>
+        </p:txBody>
+      </p:sp>
+      <p:sp>
+        <p:nvSpPr>
+          <p:cNvPr id="3" name="Rectangle 2">
+            <a:extLst>
+              <a:ext uri="{FF2B5EF4-FFF2-40B4-BE49-F238E27FC236}">
+                <a16:creationId xmlns:a16="http://schemas.microsoft.com/office/drawing/2014/main" id="{A2BFE8D2-2E57-4B31-828B-86EB59BBAA4C}"/>
+              </a:ext>
+            </a:extLst>
+          </p:cNvPr>
+          <p:cNvSpPr/>
+          <p:nvPr/>
+        </p:nvSpPr>
+        <p:spPr>
+          <a:xfrm>
+            <a:off x="5592916" y="4405018"/>
+            <a:ext cx="1838425" cy="885524"/>
+          </a:xfrm>
+          <a:prstGeom prst="rect">
+            <a:avLst/>
+          </a:prstGeom>
+        </p:spPr>
+        <p:style>
+          <a:lnRef idx="2">
+            <a:schemeClr val="dk1"/>
+          </a:lnRef>
+          <a:fillRef idx="1">
+            <a:schemeClr val="lt1"/>
+          </a:fillRef>
+          <a:effectRef idx="0">
+            <a:schemeClr val="dk1"/>
+          </a:effectRef>
+          <a:fontRef idx="minor">
+            <a:schemeClr val="dk1"/>
+          </a:fontRef>
+        </p:style>
+        <p:txBody>
+          <a:bodyPr rtlCol="0" anchor="ctr"/>
+          <a:lstStyle/>
+          <a:p>
+            <a:pPr algn="ctr"/>
+            <a:r>
+              <a:rPr lang="en-CH" dirty="0"/>
+              <a:t>L</a:t>
+            </a:r>
+            <a:r>
+              <a:rPr lang="de-CH" dirty="0"/>
+              <a:t>i</a:t>
+            </a:r>
+            <a:r>
+              <a:rPr lang="en-CH" dirty="0"/>
+              <a:t>s</a:t>
+            </a:r>
+            <a:r>
+              <a:rPr lang="de-CH" dirty="0"/>
+              <a:t>t</a:t>
+            </a:r>
+            <a:r>
+              <a:rPr lang="en-CH" dirty="0"/>
+              <a:t>&lt;</a:t>
+            </a:r>
+            <a:r>
+              <a:rPr lang="de-CH" dirty="0"/>
+              <a:t>D</a:t>
+            </a:r>
+            <a:r>
+              <a:rPr lang="en-CH" dirty="0"/>
+              <a:t>o</a:t>
+            </a:r>
+            <a:r>
+              <a:rPr lang="de-CH" dirty="0"/>
+              <a:t>g</a:t>
+            </a:r>
+            <a:r>
+              <a:rPr lang="en-CH" dirty="0"/>
+              <a:t>s&gt;</a:t>
+            </a:r>
+            <a:endParaRPr lang="de-CH" dirty="0"/>
+          </a:p>
+        </p:txBody>
+      </p:sp>
+      <p:sp>
+        <p:nvSpPr>
+          <p:cNvPr id="4" name="Rectangle 3">
+            <a:extLst>
+              <a:ext uri="{FF2B5EF4-FFF2-40B4-BE49-F238E27FC236}">
+                <a16:creationId xmlns:a16="http://schemas.microsoft.com/office/drawing/2014/main" id="{94D54094-8394-4A73-8116-94EE1E3D8F71}"/>
+              </a:ext>
+            </a:extLst>
+          </p:cNvPr>
+          <p:cNvSpPr/>
+          <p:nvPr/>
+        </p:nvSpPr>
+        <p:spPr>
+          <a:xfrm>
+            <a:off x="3294885" y="2265002"/>
+            <a:ext cx="1838425" cy="885524"/>
+          </a:xfrm>
+          <a:prstGeom prst="rect">
+            <a:avLst/>
+          </a:prstGeom>
+        </p:spPr>
+        <p:style>
+          <a:lnRef idx="2">
+            <a:schemeClr val="dk1"/>
+          </a:lnRef>
+          <a:fillRef idx="1">
+            <a:schemeClr val="lt1"/>
+          </a:fillRef>
+          <a:effectRef idx="0">
+            <a:schemeClr val="dk1"/>
+          </a:effectRef>
+          <a:fontRef idx="minor">
+            <a:schemeClr val="dk1"/>
+          </a:fontRef>
+        </p:style>
+        <p:txBody>
+          <a:bodyPr rtlCol="0" anchor="ctr"/>
+          <a:lstStyle/>
+          <a:p>
+            <a:pPr algn="ctr"/>
+            <a:r>
+              <a:rPr lang="de-CH" dirty="0"/>
+              <a:t>A</a:t>
+            </a:r>
+            <a:r>
+              <a:rPr lang="en-CH" dirty="0"/>
+              <a:t>n</a:t>
+            </a:r>
+            <a:r>
+              <a:rPr lang="de-CH" dirty="0"/>
+              <a:t>i</a:t>
+            </a:r>
+            <a:r>
+              <a:rPr lang="en-CH" dirty="0"/>
+              <a:t>m</a:t>
+            </a:r>
+            <a:r>
+              <a:rPr lang="de-CH" dirty="0"/>
+              <a:t>a</a:t>
+            </a:r>
+            <a:r>
+              <a:rPr lang="en-CH" dirty="0"/>
+              <a:t>l</a:t>
+            </a:r>
+            <a:endParaRPr lang="de-CH" dirty="0"/>
+          </a:p>
+        </p:txBody>
+      </p:sp>
+      <p:sp>
+        <p:nvSpPr>
+          <p:cNvPr id="5" name="Rectangle 4">
+            <a:extLst>
+              <a:ext uri="{FF2B5EF4-FFF2-40B4-BE49-F238E27FC236}">
+                <a16:creationId xmlns:a16="http://schemas.microsoft.com/office/drawing/2014/main" id="{15E70263-0988-40A1-9EED-94BA2EAD5F8C}"/>
+              </a:ext>
+            </a:extLst>
+          </p:cNvPr>
+          <p:cNvSpPr/>
+          <p:nvPr/>
+        </p:nvSpPr>
+        <p:spPr>
+          <a:xfrm>
+            <a:off x="3294884" y="4400206"/>
+            <a:ext cx="1838425" cy="885524"/>
+          </a:xfrm>
+          <a:prstGeom prst="rect">
+            <a:avLst/>
+          </a:prstGeom>
+        </p:spPr>
+        <p:style>
+          <a:lnRef idx="2">
+            <a:schemeClr val="dk1"/>
+          </a:lnRef>
+          <a:fillRef idx="1">
+            <a:schemeClr val="lt1"/>
+          </a:fillRef>
+          <a:effectRef idx="0">
+            <a:schemeClr val="dk1"/>
+          </a:effectRef>
+          <a:fontRef idx="minor">
+            <a:schemeClr val="dk1"/>
+          </a:fontRef>
+        </p:style>
+        <p:txBody>
+          <a:bodyPr rtlCol="0" anchor="ctr"/>
+          <a:lstStyle/>
+          <a:p>
+            <a:pPr algn="ctr"/>
+            <a:r>
+              <a:rPr lang="de-CH" dirty="0"/>
+              <a:t>D</a:t>
+            </a:r>
+            <a:r>
+              <a:rPr lang="en-CH" dirty="0"/>
+              <a:t>o</a:t>
+            </a:r>
+            <a:r>
+              <a:rPr lang="de-CH" dirty="0"/>
+              <a:t>g</a:t>
+            </a:r>
+          </a:p>
+        </p:txBody>
+      </p:sp>
+      <p:grpSp>
+        <p:nvGrpSpPr>
+          <p:cNvPr id="6" name="Group 5">
+            <a:extLst>
+              <a:ext uri="{FF2B5EF4-FFF2-40B4-BE49-F238E27FC236}">
+                <a16:creationId xmlns:a16="http://schemas.microsoft.com/office/drawing/2014/main" id="{3BBDD3F7-78CA-4549-8B68-93DF55641E32}"/>
+              </a:ext>
+            </a:extLst>
+          </p:cNvPr>
+          <p:cNvGrpSpPr/>
+          <p:nvPr/>
+        </p:nvGrpSpPr>
+        <p:grpSpPr>
+          <a:xfrm>
+            <a:off x="4063701" y="3145714"/>
+            <a:ext cx="300790" cy="1254492"/>
+            <a:chOff x="3336355" y="1852864"/>
+            <a:chExt cx="300790" cy="1254492"/>
+          </a:xfrm>
+        </p:grpSpPr>
+        <p:sp>
+          <p:nvSpPr>
+            <p:cNvPr id="7" name="Isosceles Triangle 6">
+              <a:extLst>
+                <a:ext uri="{FF2B5EF4-FFF2-40B4-BE49-F238E27FC236}">
+                  <a16:creationId xmlns:a16="http://schemas.microsoft.com/office/drawing/2014/main" id="{BB4BD29A-E51E-4E61-9395-112BD2E817A1}"/>
+                </a:ext>
+              </a:extLst>
+            </p:cNvPr>
+            <p:cNvSpPr/>
+            <p:nvPr/>
+          </p:nvSpPr>
+          <p:spPr>
+            <a:xfrm>
+              <a:off x="3336355" y="1852864"/>
+              <a:ext cx="300790" cy="348915"/>
+            </a:xfrm>
+            <a:prstGeom prst="triangle">
+              <a:avLst/>
+            </a:prstGeom>
+          </p:spPr>
+          <p:style>
+            <a:lnRef idx="2">
+              <a:schemeClr val="dk1"/>
+            </a:lnRef>
+            <a:fillRef idx="1">
+              <a:schemeClr val="lt1"/>
+            </a:fillRef>
+            <a:effectRef idx="0">
+              <a:schemeClr val="dk1"/>
+            </a:effectRef>
+            <a:fontRef idx="minor">
+              <a:schemeClr val="dk1"/>
+            </a:fontRef>
+          </p:style>
+          <p:txBody>
+            <a:bodyPr rtlCol="0" anchor="ctr"/>
+            <a:lstStyle/>
+            <a:p>
+              <a:pPr algn="ctr"/>
+              <a:endParaRPr lang="de-CH"/>
+            </a:p>
+          </p:txBody>
+        </p:sp>
+        <p:cxnSp>
+          <p:nvCxnSpPr>
+            <p:cNvPr id="8" name="Straight Connector 7">
+              <a:extLst>
+                <a:ext uri="{FF2B5EF4-FFF2-40B4-BE49-F238E27FC236}">
+                  <a16:creationId xmlns:a16="http://schemas.microsoft.com/office/drawing/2014/main" id="{9A3B60A5-070D-4F94-A676-DF0DB17F517F}"/>
+                </a:ext>
+              </a:extLst>
+            </p:cNvPr>
+            <p:cNvCxnSpPr>
+              <a:cxnSpLocks/>
+              <a:stCxn id="7" idx="3"/>
+            </p:cNvCxnSpPr>
+            <p:nvPr/>
+          </p:nvCxnSpPr>
+          <p:spPr>
+            <a:xfrm>
+              <a:off x="3486750" y="2201779"/>
+              <a:ext cx="1" cy="905577"/>
+            </a:xfrm>
+            <a:prstGeom prst="line">
+              <a:avLst/>
+            </a:prstGeom>
+          </p:spPr>
+          <p:style>
+            <a:lnRef idx="1">
+              <a:schemeClr val="dk1"/>
+            </a:lnRef>
+            <a:fillRef idx="0">
+              <a:schemeClr val="dk1"/>
+            </a:fillRef>
+            <a:effectRef idx="0">
+              <a:schemeClr val="dk1"/>
+            </a:effectRef>
+            <a:fontRef idx="minor">
+              <a:schemeClr val="tx1"/>
+            </a:fontRef>
+          </p:style>
+        </p:cxnSp>
+      </p:grpSp>
+      <p:grpSp>
+        <p:nvGrpSpPr>
+          <p:cNvPr id="9" name="Group 8">
+            <a:extLst>
+              <a:ext uri="{FF2B5EF4-FFF2-40B4-BE49-F238E27FC236}">
+                <a16:creationId xmlns:a16="http://schemas.microsoft.com/office/drawing/2014/main" id="{4EA71521-A5AC-4557-A53B-BE917A509146}"/>
+              </a:ext>
+            </a:extLst>
+          </p:cNvPr>
+          <p:cNvGrpSpPr/>
+          <p:nvPr/>
+        </p:nvGrpSpPr>
+        <p:grpSpPr>
+          <a:xfrm>
+            <a:off x="6361735" y="3152932"/>
+            <a:ext cx="300790" cy="1254492"/>
+            <a:chOff x="3336355" y="1852864"/>
+            <a:chExt cx="300790" cy="1254492"/>
+          </a:xfrm>
+        </p:grpSpPr>
+        <p:sp>
+          <p:nvSpPr>
+            <p:cNvPr id="10" name="Isosceles Triangle 9">
+              <a:extLst>
+                <a:ext uri="{FF2B5EF4-FFF2-40B4-BE49-F238E27FC236}">
+                  <a16:creationId xmlns:a16="http://schemas.microsoft.com/office/drawing/2014/main" id="{F7316DCE-8722-4F10-8EDF-E77E149E936B}"/>
+                </a:ext>
+              </a:extLst>
+            </p:cNvPr>
+            <p:cNvSpPr/>
+            <p:nvPr/>
+          </p:nvSpPr>
+          <p:spPr>
+            <a:xfrm>
+              <a:off x="3336355" y="1852864"/>
+              <a:ext cx="300790" cy="348915"/>
+            </a:xfrm>
+            <a:prstGeom prst="triangle">
+              <a:avLst/>
+            </a:prstGeom>
+          </p:spPr>
+          <p:style>
+            <a:lnRef idx="2">
+              <a:schemeClr val="dk1"/>
+            </a:lnRef>
+            <a:fillRef idx="1">
+              <a:schemeClr val="lt1"/>
+            </a:fillRef>
+            <a:effectRef idx="0">
+              <a:schemeClr val="dk1"/>
+            </a:effectRef>
+            <a:fontRef idx="minor">
+              <a:schemeClr val="dk1"/>
+            </a:fontRef>
+          </p:style>
+          <p:txBody>
+            <a:bodyPr rtlCol="0" anchor="ctr"/>
+            <a:lstStyle/>
+            <a:p>
+              <a:pPr algn="ctr"/>
+              <a:endParaRPr lang="de-CH"/>
+            </a:p>
+          </p:txBody>
+        </p:sp>
+        <p:cxnSp>
+          <p:nvCxnSpPr>
+            <p:cNvPr id="11" name="Straight Connector 10">
+              <a:extLst>
+                <a:ext uri="{FF2B5EF4-FFF2-40B4-BE49-F238E27FC236}">
+                  <a16:creationId xmlns:a16="http://schemas.microsoft.com/office/drawing/2014/main" id="{6D3BFD7D-B157-476F-962C-6884B62704C2}"/>
+                </a:ext>
+              </a:extLst>
+            </p:cNvPr>
+            <p:cNvCxnSpPr>
+              <a:cxnSpLocks/>
+              <a:stCxn id="10" idx="3"/>
+            </p:cNvCxnSpPr>
+            <p:nvPr/>
+          </p:nvCxnSpPr>
+          <p:spPr>
+            <a:xfrm>
+              <a:off x="3486750" y="2201779"/>
+              <a:ext cx="1" cy="905577"/>
+            </a:xfrm>
+            <a:prstGeom prst="line">
+              <a:avLst/>
+            </a:prstGeom>
+          </p:spPr>
+          <p:style>
+            <a:lnRef idx="1">
+              <a:schemeClr val="dk1"/>
+            </a:lnRef>
+            <a:fillRef idx="0">
+              <a:schemeClr val="dk1"/>
+            </a:fillRef>
+            <a:effectRef idx="0">
+              <a:schemeClr val="dk1"/>
+            </a:effectRef>
+            <a:fontRef idx="minor">
+              <a:schemeClr val="tx1"/>
+            </a:fontRef>
+          </p:style>
+        </p:cxnSp>
+      </p:grpSp>
+    </p:spTree>
+    <p:extLst>
+      <p:ext uri="{BB962C8B-B14F-4D97-AF65-F5344CB8AC3E}">
+        <p14:creationId xmlns:p14="http://schemas.microsoft.com/office/powerpoint/2010/main" val="251206626"/>
+      </p:ext>
+    </p:extLst>
+  </p:cSld>
+  <p:clrMapOvr>
+    <a:masterClrMapping/>
+  </p:clrMapOvr>
+</p:sld>
+</file>
+
 <file path=ppt/theme/theme1.xml><?xml version="1.0" encoding="utf-8"?>
 <a:theme xmlns:a="http://schemas.openxmlformats.org/drawingml/2006/main" name="Office Theme">
   <a:themeElements>

</xml_diff>